<commit_message>
Updated presentation and notebook
</commit_message>
<xml_diff>
--- a/presentation.pptx
+++ b/presentation.pptx
@@ -7,14 +7,18 @@
   <p:sldIdLst>
     <p:sldId id="256" r:id="rId2"/>
     <p:sldId id="257" r:id="rId3"/>
-    <p:sldId id="258" r:id="rId4"/>
-    <p:sldId id="259" r:id="rId5"/>
-    <p:sldId id="265" r:id="rId6"/>
-    <p:sldId id="260" r:id="rId7"/>
-    <p:sldId id="261" r:id="rId8"/>
-    <p:sldId id="262" r:id="rId9"/>
-    <p:sldId id="263" r:id="rId10"/>
-    <p:sldId id="264" r:id="rId11"/>
+    <p:sldId id="268" r:id="rId4"/>
+    <p:sldId id="258" r:id="rId5"/>
+    <p:sldId id="269" r:id="rId6"/>
+    <p:sldId id="259" r:id="rId7"/>
+    <p:sldId id="265" r:id="rId8"/>
+    <p:sldId id="260" r:id="rId9"/>
+    <p:sldId id="261" r:id="rId10"/>
+    <p:sldId id="262" r:id="rId11"/>
+    <p:sldId id="263" r:id="rId12"/>
+    <p:sldId id="266" r:id="rId13"/>
+    <p:sldId id="267" r:id="rId14"/>
+    <p:sldId id="264" r:id="rId15"/>
   </p:sldIdLst>
   <p:sldSz cx="12192000" cy="6858000"/>
   <p:notesSz cx="6858000" cy="9144000"/>
@@ -115,7 +119,18 @@
   </p:defaultTextStyle>
   <p:extLst>
     <p:ext uri="{EFAFB233-063F-42B5-8137-9DF3F51BA10A}">
-      <p15:sldGuideLst xmlns:p15="http://schemas.microsoft.com/office/powerpoint/2012/main"/>
+      <p15:sldGuideLst xmlns:p15="http://schemas.microsoft.com/office/powerpoint/2012/main">
+        <p15:guide id="1" pos="3840" userDrawn="1">
+          <p15:clr>
+            <a:srgbClr val="A4A3A4"/>
+          </p15:clr>
+        </p15:guide>
+        <p15:guide id="2" orient="horz" pos="2160" userDrawn="1">
+          <p15:clr>
+            <a:srgbClr val="A4A3A4"/>
+          </p15:clr>
+        </p15:guide>
+      </p15:sldGuideLst>
     </p:ext>
   </p:extLst>
 </p:presentation>
@@ -252,7 +267,7 @@
           <a:p>
             <a:fld id="{FEAFAA5B-A067-44C5-BC05-80171B363320}" type="datetimeFigureOut">
               <a:rPr lang="it-IT" smtClean="0"/>
-              <a:t>10/11/2023</a:t>
+              <a:t>11/11/2023</a:t>
             </a:fld>
             <a:endParaRPr lang="it-IT"/>
           </a:p>
@@ -422,7 +437,7 @@
           <a:p>
             <a:fld id="{FEAFAA5B-A067-44C5-BC05-80171B363320}" type="datetimeFigureOut">
               <a:rPr lang="it-IT" smtClean="0"/>
-              <a:t>10/11/2023</a:t>
+              <a:t>11/11/2023</a:t>
             </a:fld>
             <a:endParaRPr lang="it-IT"/>
           </a:p>
@@ -602,7 +617,7 @@
           <a:p>
             <a:fld id="{FEAFAA5B-A067-44C5-BC05-80171B363320}" type="datetimeFigureOut">
               <a:rPr lang="it-IT" smtClean="0"/>
-              <a:t>10/11/2023</a:t>
+              <a:t>11/11/2023</a:t>
             </a:fld>
             <a:endParaRPr lang="it-IT"/>
           </a:p>
@@ -772,7 +787,7 @@
           <a:p>
             <a:fld id="{FEAFAA5B-A067-44C5-BC05-80171B363320}" type="datetimeFigureOut">
               <a:rPr lang="it-IT" smtClean="0"/>
-              <a:t>10/11/2023</a:t>
+              <a:t>11/11/2023</a:t>
             </a:fld>
             <a:endParaRPr lang="it-IT"/>
           </a:p>
@@ -1018,7 +1033,7 @@
           <a:p>
             <a:fld id="{FEAFAA5B-A067-44C5-BC05-80171B363320}" type="datetimeFigureOut">
               <a:rPr lang="it-IT" smtClean="0"/>
-              <a:t>10/11/2023</a:t>
+              <a:t>11/11/2023</a:t>
             </a:fld>
             <a:endParaRPr lang="it-IT"/>
           </a:p>
@@ -1250,7 +1265,7 @@
           <a:p>
             <a:fld id="{FEAFAA5B-A067-44C5-BC05-80171B363320}" type="datetimeFigureOut">
               <a:rPr lang="it-IT" smtClean="0"/>
-              <a:t>10/11/2023</a:t>
+              <a:t>11/11/2023</a:t>
             </a:fld>
             <a:endParaRPr lang="it-IT"/>
           </a:p>
@@ -1617,7 +1632,7 @@
           <a:p>
             <a:fld id="{FEAFAA5B-A067-44C5-BC05-80171B363320}" type="datetimeFigureOut">
               <a:rPr lang="it-IT" smtClean="0"/>
-              <a:t>10/11/2023</a:t>
+              <a:t>11/11/2023</a:t>
             </a:fld>
             <a:endParaRPr lang="it-IT"/>
           </a:p>
@@ -1735,7 +1750,7 @@
           <a:p>
             <a:fld id="{FEAFAA5B-A067-44C5-BC05-80171B363320}" type="datetimeFigureOut">
               <a:rPr lang="it-IT" smtClean="0"/>
-              <a:t>10/11/2023</a:t>
+              <a:t>11/11/2023</a:t>
             </a:fld>
             <a:endParaRPr lang="it-IT"/>
           </a:p>
@@ -1830,7 +1845,7 @@
           <a:p>
             <a:fld id="{FEAFAA5B-A067-44C5-BC05-80171B363320}" type="datetimeFigureOut">
               <a:rPr lang="it-IT" smtClean="0"/>
-              <a:t>10/11/2023</a:t>
+              <a:t>11/11/2023</a:t>
             </a:fld>
             <a:endParaRPr lang="it-IT"/>
           </a:p>
@@ -2107,7 +2122,7 @@
           <a:p>
             <a:fld id="{FEAFAA5B-A067-44C5-BC05-80171B363320}" type="datetimeFigureOut">
               <a:rPr lang="it-IT" smtClean="0"/>
-              <a:t>10/11/2023</a:t>
+              <a:t>11/11/2023</a:t>
             </a:fld>
             <a:endParaRPr lang="it-IT"/>
           </a:p>
@@ -2360,7 +2375,7 @@
           <a:p>
             <a:fld id="{FEAFAA5B-A067-44C5-BC05-80171B363320}" type="datetimeFigureOut">
               <a:rPr lang="it-IT" smtClean="0"/>
-              <a:t>10/11/2023</a:t>
+              <a:t>11/11/2023</a:t>
             </a:fld>
             <a:endParaRPr lang="it-IT"/>
           </a:p>
@@ -2582,7 +2597,7 @@
           <a:p>
             <a:fld id="{FEAFAA5B-A067-44C5-BC05-80171B363320}" type="datetimeFigureOut">
               <a:rPr lang="it-IT" smtClean="0"/>
-              <a:t>10/11/2023</a:t>
+              <a:t>11/11/2023</a:t>
             </a:fld>
             <a:endParaRPr lang="it-IT"/>
           </a:p>
@@ -2989,14 +3004,14 @@
       </p:grpSpPr>
       <p:sp>
         <p:nvSpPr>
-          <p:cNvPr id="4" name="CasellaDiTesto 3"/>
+          <p:cNvPr id="2" name="CasellaDiTesto 1"/>
           <p:cNvSpPr txBox="1"/>
           <p:nvPr/>
         </p:nvSpPr>
         <p:spPr>
           <a:xfrm>
-            <a:off x="5659394" y="2891480"/>
-            <a:ext cx="721031" cy="369332"/>
+            <a:off x="2347784" y="2767280"/>
+            <a:ext cx="7496432" cy="1323439"/>
           </a:xfrm>
           <a:prstGeom prst="rect">
             <a:avLst/>
@@ -3004,16 +3019,52 @@
           <a:noFill/>
         </p:spPr>
         <p:txBody>
-          <a:bodyPr wrap="none" rtlCol="0">
-            <a:spAutoFit/>
+          <a:bodyPr wrap="square" rtlCol="0">
+            <a:noAutofit/>
           </a:bodyPr>
           <a:lstStyle/>
           <a:p>
-            <a:r>
-              <a:rPr lang="it-IT" dirty="0" smtClean="0"/>
-              <a:t>Titolo</a:t>
-            </a:r>
-            <a:endParaRPr lang="it-IT" dirty="0"/>
+            <a:pPr algn="ctr"/>
+            <a:r>
+              <a:rPr lang="it-IT" sz="4000" dirty="0" smtClean="0"/>
+              <a:t>Dot </a:t>
+            </a:r>
+            <a:r>
+              <a:rPr lang="it-IT" sz="4000" dirty="0" err="1" smtClean="0"/>
+              <a:t>Patterns</a:t>
+            </a:r>
+            <a:r>
+              <a:rPr lang="it-IT" sz="4000" dirty="0" smtClean="0"/>
+              <a:t> </a:t>
+            </a:r>
+            <a:r>
+              <a:rPr lang="it-IT" sz="4000" dirty="0" err="1" smtClean="0"/>
+              <a:t>Perceptual</a:t>
+            </a:r>
+            <a:r>
+              <a:rPr lang="it-IT" sz="4000" dirty="0" smtClean="0"/>
+              <a:t> </a:t>
+            </a:r>
+            <a:r>
+              <a:rPr lang="it-IT" sz="4000" dirty="0" err="1" smtClean="0"/>
+              <a:t>Grouping</a:t>
+            </a:r>
+            <a:r>
+              <a:rPr lang="it-IT" sz="4000" dirty="0" smtClean="0"/>
+              <a:t>:</a:t>
+            </a:r>
+          </a:p>
+          <a:p>
+            <a:pPr algn="ctr"/>
+            <a:r>
+              <a:rPr lang="it-IT" sz="4000" dirty="0" smtClean="0"/>
+              <a:t>RDG vs K-</a:t>
+            </a:r>
+            <a:r>
+              <a:rPr lang="it-IT" sz="4000" dirty="0" err="1" smtClean="0"/>
+              <a:t>means</a:t>
+            </a:r>
+            <a:endParaRPr lang="it-IT" sz="4000" dirty="0"/>
           </a:p>
         </p:txBody>
       </p:sp>
@@ -3033,6 +3084,20 @@
 <file path=ppt/slides/slide10.xml><?xml version="1.0" encoding="utf-8"?>
 <p:sld xmlns:a="http://schemas.openxmlformats.org/drawingml/2006/main" xmlns:r="http://schemas.openxmlformats.org/officeDocument/2006/relationships" xmlns:p="http://schemas.openxmlformats.org/presentationml/2006/main">
   <p:cSld>
+    <p:bg>
+      <p:bgPr>
+        <a:blipFill dpi="0" rotWithShape="1">
+          <a:blip r:embed="rId2">
+            <a:lum/>
+          </a:blip>
+          <a:srcRect/>
+          <a:stretch>
+            <a:fillRect/>
+          </a:stretch>
+        </a:blipFill>
+        <a:effectLst/>
+      </p:bgPr>
+    </p:bg>
     <p:spTree>
       <p:nvGrpSpPr>
         <p:cNvPr id="1" name=""/>
@@ -3055,8 +3120,8 @@
         </p:nvSpPr>
         <p:spPr>
           <a:xfrm>
-            <a:off x="4291914" y="197708"/>
-            <a:ext cx="2555508" cy="523220"/>
+            <a:off x="4869157" y="180000"/>
+            <a:ext cx="2453685" cy="523220"/>
           </a:xfrm>
           <a:prstGeom prst="rect">
             <a:avLst/>
@@ -3071,15 +3136,7 @@
           <a:p>
             <a:r>
               <a:rPr lang="it-IT" sz="2800" dirty="0" smtClean="0"/>
-              <a:t>K-</a:t>
-            </a:r>
-            <a:r>
-              <a:rPr lang="it-IT" sz="2800" dirty="0" err="1" smtClean="0"/>
-              <a:t>means</a:t>
-            </a:r>
-            <a:r>
-              <a:rPr lang="it-IT" sz="2800" dirty="0" smtClean="0"/>
-              <a:t> vs RDG</a:t>
+              <a:t>RDG: Algoritmo</a:t>
             </a:r>
             <a:endParaRPr lang="it-IT" sz="2800" dirty="0"/>
           </a:p>
@@ -3093,8 +3150,8 @@
         </p:nvSpPr>
         <p:spPr>
           <a:xfrm>
-            <a:off x="1186249" y="1375719"/>
-            <a:ext cx="6014660" cy="369332"/>
+            <a:off x="1016905" y="2706905"/>
+            <a:ext cx="10140778" cy="369332"/>
           </a:xfrm>
           <a:prstGeom prst="rect">
             <a:avLst/>
@@ -3102,11 +3159,1025 @@
           <a:noFill/>
         </p:spPr>
         <p:txBody>
+          <a:bodyPr wrap="square" rtlCol="0">
+            <a:spAutoFit/>
+          </a:bodyPr>
+          <a:lstStyle/>
+          <a:p>
+            <a:r>
+              <a:rPr lang="it-IT" dirty="0" smtClean="0"/>
+              <a:t>1. </a:t>
+            </a:r>
+            <a:r>
+              <a:rPr lang="it-IT" dirty="0" smtClean="0"/>
+              <a:t>Calcolare </a:t>
+            </a:r>
+            <a:r>
+              <a:rPr lang="it-IT" dirty="0" smtClean="0"/>
+              <a:t>la </a:t>
+            </a:r>
+            <a:r>
+              <a:rPr lang="it-IT" b="1" dirty="0" smtClean="0"/>
+              <a:t>triangolazione di </a:t>
+            </a:r>
+            <a:r>
+              <a:rPr lang="it-IT" b="1" dirty="0" err="1" smtClean="0"/>
+              <a:t>Delaunay</a:t>
+            </a:r>
+            <a:r>
+              <a:rPr lang="it-IT" dirty="0"/>
+              <a:t> </a:t>
+            </a:r>
+            <a:r>
+              <a:rPr lang="it-IT" dirty="0" smtClean="0"/>
+              <a:t>sui punti dati in input</a:t>
+            </a:r>
+            <a:endParaRPr lang="it-IT" b="1" dirty="0"/>
+          </a:p>
+        </p:txBody>
+      </p:sp>
+      <p:sp>
+        <p:nvSpPr>
+          <p:cNvPr id="4" name="CasellaDiTesto 3"/>
+          <p:cNvSpPr txBox="1"/>
+          <p:nvPr/>
+        </p:nvSpPr>
+        <p:spPr>
+          <a:xfrm>
+            <a:off x="1016905" y="3076237"/>
+            <a:ext cx="10140778" cy="369332"/>
+          </a:xfrm>
+          <a:prstGeom prst="rect">
+            <a:avLst/>
+          </a:prstGeom>
+          <a:noFill/>
+        </p:spPr>
+        <p:txBody>
+          <a:bodyPr wrap="square" rtlCol="0">
+            <a:spAutoFit/>
+          </a:bodyPr>
+          <a:lstStyle/>
+          <a:p>
+            <a:r>
+              <a:rPr lang="it-IT" dirty="0" smtClean="0"/>
+              <a:t>2. </a:t>
+            </a:r>
+            <a:r>
+              <a:rPr lang="it-IT" dirty="0" smtClean="0"/>
+              <a:t>Calcolare </a:t>
+            </a:r>
+            <a:r>
+              <a:rPr lang="it-IT" dirty="0" smtClean="0"/>
+              <a:t>le </a:t>
+            </a:r>
+            <a:r>
+              <a:rPr lang="it-IT" b="1" dirty="0" smtClean="0"/>
+              <a:t>distanze</a:t>
+            </a:r>
+            <a:r>
+              <a:rPr lang="it-IT" dirty="0" smtClean="0"/>
+              <a:t> tra i vicini</a:t>
+            </a:r>
+            <a:endParaRPr lang="it-IT" dirty="0"/>
+          </a:p>
+        </p:txBody>
+      </p:sp>
+      <p:sp>
+        <p:nvSpPr>
+          <p:cNvPr id="5" name="CasellaDiTesto 4"/>
+          <p:cNvSpPr txBox="1"/>
+          <p:nvPr/>
+        </p:nvSpPr>
+        <p:spPr>
+          <a:xfrm>
+            <a:off x="1016905" y="3445569"/>
+            <a:ext cx="10140778" cy="369332"/>
+          </a:xfrm>
+          <a:prstGeom prst="rect">
+            <a:avLst/>
+          </a:prstGeom>
+          <a:noFill/>
+        </p:spPr>
+        <p:txBody>
+          <a:bodyPr wrap="square" rtlCol="0">
+            <a:spAutoFit/>
+          </a:bodyPr>
+          <a:lstStyle/>
+          <a:p>
+            <a:r>
+              <a:rPr lang="it-IT" dirty="0" smtClean="0"/>
+              <a:t>3. </a:t>
+            </a:r>
+            <a:r>
+              <a:rPr lang="it-IT" b="1" dirty="0" smtClean="0"/>
+              <a:t>Normalizzare</a:t>
+            </a:r>
+            <a:r>
+              <a:rPr lang="it-IT" dirty="0" smtClean="0"/>
+              <a:t> </a:t>
+            </a:r>
+            <a:r>
+              <a:rPr lang="it-IT" dirty="0" smtClean="0"/>
+              <a:t>distanze con il minimo delle distanze tra i vicini</a:t>
+            </a:r>
+          </a:p>
+        </p:txBody>
+      </p:sp>
+      <p:sp>
+        <p:nvSpPr>
+          <p:cNvPr id="6" name="CasellaDiTesto 5"/>
+          <p:cNvSpPr txBox="1"/>
+          <p:nvPr/>
+        </p:nvSpPr>
+        <p:spPr>
+          <a:xfrm>
+            <a:off x="1016904" y="3814901"/>
+            <a:ext cx="10735985" cy="369332"/>
+          </a:xfrm>
+          <a:prstGeom prst="rect">
+            <a:avLst/>
+          </a:prstGeom>
+          <a:noFill/>
+        </p:spPr>
+        <p:txBody>
+          <a:bodyPr wrap="square" rtlCol="0">
+            <a:spAutoFit/>
+          </a:bodyPr>
+          <a:lstStyle/>
+          <a:p>
+            <a:r>
+              <a:rPr lang="it-IT" dirty="0"/>
+              <a:t>4</a:t>
+            </a:r>
+            <a:r>
+              <a:rPr lang="it-IT" dirty="0" smtClean="0"/>
+              <a:t>. </a:t>
+            </a:r>
+            <a:r>
+              <a:rPr lang="it-IT" dirty="0" smtClean="0"/>
+              <a:t>Calcolare </a:t>
+            </a:r>
+            <a:r>
+              <a:rPr lang="it-IT" dirty="0" smtClean="0"/>
+              <a:t>la </a:t>
+            </a:r>
+            <a:r>
+              <a:rPr lang="it-IT" b="1" dirty="0" smtClean="0"/>
+              <a:t>media geometrica </a:t>
+            </a:r>
+            <a:r>
+              <a:rPr lang="it-IT" dirty="0" smtClean="0"/>
+              <a:t>tra i due rapporti che ho trovato per ogni </a:t>
+            </a:r>
+            <a:r>
+              <a:rPr lang="it-IT" dirty="0" err="1" smtClean="0"/>
+              <a:t>edge</a:t>
+            </a:r>
+            <a:r>
+              <a:rPr lang="it-IT" dirty="0" smtClean="0"/>
+              <a:t> e associo il risultato ad ogni </a:t>
+            </a:r>
+            <a:r>
+              <a:rPr lang="it-IT" dirty="0" err="1" smtClean="0"/>
+              <a:t>edge</a:t>
+            </a:r>
+            <a:endParaRPr lang="it-IT" dirty="0" smtClean="0"/>
+          </a:p>
+        </p:txBody>
+      </p:sp>
+      <p:sp>
+        <p:nvSpPr>
+          <p:cNvPr id="7" name="CasellaDiTesto 6"/>
+          <p:cNvSpPr txBox="1"/>
+          <p:nvPr/>
+        </p:nvSpPr>
+        <p:spPr>
+          <a:xfrm>
+            <a:off x="1016905" y="4184233"/>
+            <a:ext cx="10140778" cy="369332"/>
+          </a:xfrm>
+          <a:prstGeom prst="rect">
+            <a:avLst/>
+          </a:prstGeom>
+          <a:noFill/>
+        </p:spPr>
+        <p:txBody>
+          <a:bodyPr wrap="square" rtlCol="0">
+            <a:spAutoFit/>
+          </a:bodyPr>
+          <a:lstStyle/>
+          <a:p>
+            <a:r>
+              <a:rPr lang="it-IT" dirty="0" smtClean="0"/>
+              <a:t>5. </a:t>
+            </a:r>
+            <a:r>
+              <a:rPr lang="it-IT" b="1" dirty="0" err="1" smtClean="0"/>
+              <a:t>Thresholding</a:t>
+            </a:r>
+            <a:r>
+              <a:rPr lang="it-IT" dirty="0" smtClean="0"/>
+              <a:t>: </a:t>
+            </a:r>
+            <a:r>
+              <a:rPr lang="it-IT" dirty="0" smtClean="0"/>
+              <a:t>eliminare </a:t>
+            </a:r>
+            <a:r>
+              <a:rPr lang="it-IT" dirty="0" smtClean="0"/>
+              <a:t>gli </a:t>
+            </a:r>
+            <a:r>
+              <a:rPr lang="it-IT" dirty="0" err="1" smtClean="0"/>
+              <a:t>edge</a:t>
+            </a:r>
+            <a:r>
+              <a:rPr lang="it-IT" dirty="0" smtClean="0"/>
+              <a:t> il cui numero assegnato al punto 4. è maggiore di un certo </a:t>
+            </a:r>
+            <a:r>
+              <a:rPr lang="it-IT" dirty="0" err="1" smtClean="0"/>
+              <a:t>threshold</a:t>
+            </a:r>
+            <a:endParaRPr lang="it-IT" dirty="0" smtClean="0"/>
+          </a:p>
+        </p:txBody>
+      </p:sp>
+      <p:sp>
+        <p:nvSpPr>
+          <p:cNvPr id="9" name="CasellaDiTesto 8"/>
+          <p:cNvSpPr txBox="1"/>
+          <p:nvPr/>
+        </p:nvSpPr>
+        <p:spPr>
+          <a:xfrm>
+            <a:off x="1016905" y="1118718"/>
+            <a:ext cx="7704503" cy="646331"/>
+          </a:xfrm>
+          <a:prstGeom prst="rect">
+            <a:avLst/>
+          </a:prstGeom>
+          <a:noFill/>
+        </p:spPr>
+        <p:txBody>
+          <a:bodyPr wrap="square" rtlCol="0">
+            <a:spAutoFit/>
+          </a:bodyPr>
+          <a:lstStyle/>
+          <a:p>
+            <a:r>
+              <a:rPr lang="it-IT" b="1" dirty="0" smtClean="0"/>
+              <a:t>Input</a:t>
+            </a:r>
+            <a:r>
+              <a:rPr lang="it-IT" dirty="0" smtClean="0"/>
+              <a:t>: un array di punti nel piano caratterizzati da una coppia di coordinate [</a:t>
+            </a:r>
+            <a:r>
+              <a:rPr lang="it-IT" dirty="0" err="1" smtClean="0"/>
+              <a:t>x,y</a:t>
+            </a:r>
+            <a:r>
+              <a:rPr lang="it-IT" dirty="0" smtClean="0"/>
+              <a:t>].</a:t>
+            </a:r>
+            <a:endParaRPr lang="it-IT" dirty="0" smtClean="0"/>
+          </a:p>
+          <a:p>
+            <a:r>
+              <a:rPr lang="it-IT" b="1" dirty="0" smtClean="0"/>
+              <a:t>Output</a:t>
+            </a:r>
+            <a:r>
+              <a:rPr lang="it-IT" dirty="0" smtClean="0"/>
+              <a:t>: un array di punti ridotto che, collegati con </a:t>
+            </a:r>
+            <a:r>
+              <a:rPr lang="it-IT" dirty="0" err="1" smtClean="0"/>
+              <a:t>edge</a:t>
+            </a:r>
+            <a:r>
+              <a:rPr lang="it-IT" dirty="0" smtClean="0"/>
+              <a:t>, formano </a:t>
+            </a:r>
+            <a:r>
+              <a:rPr lang="it-IT" dirty="0" smtClean="0"/>
+              <a:t>l’RDG.</a:t>
+            </a:r>
+            <a:endParaRPr lang="it-IT" dirty="0" smtClean="0"/>
+          </a:p>
+        </p:txBody>
+      </p:sp>
+    </p:spTree>
+    <p:extLst>
+      <p:ext uri="{BB962C8B-B14F-4D97-AF65-F5344CB8AC3E}">
+        <p14:creationId xmlns:p14="http://schemas.microsoft.com/office/powerpoint/2010/main" val="1733597500"/>
+      </p:ext>
+    </p:extLst>
+  </p:cSld>
+  <p:clrMapOvr>
+    <a:masterClrMapping/>
+  </p:clrMapOvr>
+  <p:timing>
+    <p:tnLst>
+      <p:par>
+        <p:cTn id="1" dur="indefinite" restart="never" nodeType="tmRoot"/>
+      </p:par>
+    </p:tnLst>
+  </p:timing>
+</p:sld>
+</file>
+
+<file path=ppt/slides/slide11.xml><?xml version="1.0" encoding="utf-8"?>
+<p:sld xmlns:a="http://schemas.openxmlformats.org/drawingml/2006/main" xmlns:r="http://schemas.openxmlformats.org/officeDocument/2006/relationships" xmlns:p="http://schemas.openxmlformats.org/presentationml/2006/main">
+  <p:cSld>
+    <p:spTree>
+      <p:nvGrpSpPr>
+        <p:cNvPr id="1" name=""/>
+        <p:cNvGrpSpPr/>
+        <p:nvPr/>
+      </p:nvGrpSpPr>
+      <p:grpSpPr>
+        <a:xfrm>
+          <a:off x="0" y="0"/>
+          <a:ext cx="0" cy="0"/>
+          <a:chOff x="0" y="0"/>
+          <a:chExt cx="0" cy="0"/>
+        </a:xfrm>
+      </p:grpSpPr>
+      <p:sp>
+        <p:nvSpPr>
+          <p:cNvPr id="3" name="CasellaDiTesto 2"/>
+          <p:cNvSpPr txBox="1"/>
+          <p:nvPr/>
+        </p:nvSpPr>
+        <p:spPr>
+          <a:xfrm>
+            <a:off x="4818246" y="180000"/>
+            <a:ext cx="2555508" cy="523220"/>
+          </a:xfrm>
+          <a:prstGeom prst="rect">
+            <a:avLst/>
+          </a:prstGeom>
+          <a:noFill/>
+        </p:spPr>
+        <p:txBody>
           <a:bodyPr wrap="none" rtlCol="0">
             <a:spAutoFit/>
           </a:bodyPr>
           <a:lstStyle/>
           <a:p>
+            <a:pPr algn="ctr"/>
+            <a:r>
+              <a:rPr lang="it-IT" sz="2800" dirty="0" smtClean="0"/>
+              <a:t>K-</a:t>
+            </a:r>
+            <a:r>
+              <a:rPr lang="it-IT" sz="2800" dirty="0" err="1" smtClean="0"/>
+              <a:t>means</a:t>
+            </a:r>
+            <a:r>
+              <a:rPr lang="it-IT" sz="2800" dirty="0" smtClean="0"/>
+              <a:t> vs RDG</a:t>
+            </a:r>
+            <a:endParaRPr lang="it-IT" sz="2800" dirty="0"/>
+          </a:p>
+        </p:txBody>
+      </p:sp>
+      <p:sp>
+        <p:nvSpPr>
+          <p:cNvPr id="4" name="CasellaDiTesto 3"/>
+          <p:cNvSpPr txBox="1"/>
+          <p:nvPr/>
+        </p:nvSpPr>
+        <p:spPr>
+          <a:xfrm>
+            <a:off x="1186249" y="1375719"/>
+            <a:ext cx="8147743" cy="369332"/>
+          </a:xfrm>
+          <a:prstGeom prst="rect">
+            <a:avLst/>
+          </a:prstGeom>
+          <a:noFill/>
+        </p:spPr>
+        <p:txBody>
+          <a:bodyPr wrap="none" rtlCol="0">
+            <a:spAutoFit/>
+          </a:bodyPr>
+          <a:lstStyle/>
+          <a:p>
+            <a:r>
+              <a:rPr lang="it-IT" dirty="0" smtClean="0"/>
+              <a:t>[mettere immagini e magari complessità computazionale e tempi di esecuzione medi]</a:t>
+            </a:r>
+            <a:endParaRPr lang="it-IT" dirty="0"/>
+          </a:p>
+        </p:txBody>
+      </p:sp>
+    </p:spTree>
+    <p:extLst>
+      <p:ext uri="{BB962C8B-B14F-4D97-AF65-F5344CB8AC3E}">
+        <p14:creationId xmlns:p14="http://schemas.microsoft.com/office/powerpoint/2010/main" val="3829976881"/>
+      </p:ext>
+    </p:extLst>
+  </p:cSld>
+  <p:clrMapOvr>
+    <a:masterClrMapping/>
+  </p:clrMapOvr>
+  <p:timing>
+    <p:tnLst>
+      <p:par>
+        <p:cTn id="1" dur="indefinite" restart="never" nodeType="tmRoot"/>
+      </p:par>
+    </p:tnLst>
+  </p:timing>
+</p:sld>
+</file>
+
+<file path=ppt/slides/slide12.xml><?xml version="1.0" encoding="utf-8"?>
+<p:sld xmlns:a="http://schemas.openxmlformats.org/drawingml/2006/main" xmlns:r="http://schemas.openxmlformats.org/officeDocument/2006/relationships" xmlns:p="http://schemas.openxmlformats.org/presentationml/2006/main">
+  <p:cSld>
+    <p:spTree>
+      <p:nvGrpSpPr>
+        <p:cNvPr id="1" name=""/>
+        <p:cNvGrpSpPr/>
+        <p:nvPr/>
+      </p:nvGrpSpPr>
+      <p:grpSpPr>
+        <a:xfrm>
+          <a:off x="0" y="0"/>
+          <a:ext cx="0" cy="0"/>
+          <a:chOff x="0" y="0"/>
+          <a:chExt cx="0" cy="0"/>
+        </a:xfrm>
+      </p:grpSpPr>
+      <p:sp>
+        <p:nvSpPr>
+          <p:cNvPr id="3" name="CasellaDiTesto 2"/>
+          <p:cNvSpPr txBox="1"/>
+          <p:nvPr/>
+        </p:nvSpPr>
+        <p:spPr>
+          <a:xfrm>
+            <a:off x="4818246" y="180000"/>
+            <a:ext cx="2555508" cy="523220"/>
+          </a:xfrm>
+          <a:prstGeom prst="rect">
+            <a:avLst/>
+          </a:prstGeom>
+          <a:noFill/>
+        </p:spPr>
+        <p:txBody>
+          <a:bodyPr wrap="none" rtlCol="0">
+            <a:spAutoFit/>
+          </a:bodyPr>
+          <a:lstStyle/>
+          <a:p>
+            <a:pPr algn="ctr"/>
+            <a:r>
+              <a:rPr lang="it-IT" sz="2800" dirty="0" smtClean="0"/>
+              <a:t>K-</a:t>
+            </a:r>
+            <a:r>
+              <a:rPr lang="it-IT" sz="2800" dirty="0" err="1" smtClean="0"/>
+              <a:t>means</a:t>
+            </a:r>
+            <a:r>
+              <a:rPr lang="it-IT" sz="2800" dirty="0" smtClean="0"/>
+              <a:t> vs RDG</a:t>
+            </a:r>
+            <a:endParaRPr lang="it-IT" sz="2800" dirty="0"/>
+          </a:p>
+        </p:txBody>
+      </p:sp>
+      <p:sp>
+        <p:nvSpPr>
+          <p:cNvPr id="4" name="CasellaDiTesto 3"/>
+          <p:cNvSpPr txBox="1"/>
+          <p:nvPr/>
+        </p:nvSpPr>
+        <p:spPr>
+          <a:xfrm>
+            <a:off x="1186249" y="1375719"/>
+            <a:ext cx="5584799" cy="1200329"/>
+          </a:xfrm>
+          <a:prstGeom prst="rect">
+            <a:avLst/>
+          </a:prstGeom>
+          <a:noFill/>
+        </p:spPr>
+        <p:txBody>
+          <a:bodyPr wrap="none" rtlCol="0">
+            <a:spAutoFit/>
+          </a:bodyPr>
+          <a:lstStyle/>
+          <a:p>
+            <a:r>
+              <a:rPr lang="it-IT" dirty="0" smtClean="0"/>
+              <a:t>[somiglianze e differenze]</a:t>
+            </a:r>
+          </a:p>
+          <a:p>
+            <a:r>
+              <a:rPr lang="it-IT" b="1" dirty="0" smtClean="0"/>
+              <a:t>Somiglianze</a:t>
+            </a:r>
+            <a:r>
+              <a:rPr lang="it-IT" dirty="0" smtClean="0"/>
+              <a:t>:</a:t>
+            </a:r>
+          </a:p>
+          <a:p>
+            <a:pPr marL="285750" indent="-285750">
+              <a:buFont typeface="Arial" panose="020B0604020202020204" pitchFamily="34" charset="0"/>
+              <a:buChar char="•"/>
+            </a:pPr>
+            <a:r>
+              <a:rPr lang="it-IT" dirty="0" smtClean="0"/>
+              <a:t>Entrambi sono algoritmi </a:t>
+            </a:r>
+            <a:r>
+              <a:rPr lang="it-IT" b="1" dirty="0" smtClean="0"/>
+              <a:t>non supervisionati</a:t>
+            </a:r>
+          </a:p>
+          <a:p>
+            <a:pPr marL="285750" indent="-285750">
+              <a:buFont typeface="Arial" panose="020B0604020202020204" pitchFamily="34" charset="0"/>
+              <a:buChar char="•"/>
+            </a:pPr>
+            <a:r>
+              <a:rPr lang="it-IT" dirty="0" smtClean="0"/>
+              <a:t>La </a:t>
+            </a:r>
+            <a:r>
+              <a:rPr lang="it-IT" b="1" dirty="0" err="1" smtClean="0"/>
+              <a:t>tassellazione</a:t>
+            </a:r>
+            <a:r>
+              <a:rPr lang="it-IT" dirty="0" smtClean="0"/>
+              <a:t> del piano è parte delle loro operazioni</a:t>
+            </a:r>
+          </a:p>
+        </p:txBody>
+      </p:sp>
+      <p:sp>
+        <p:nvSpPr>
+          <p:cNvPr id="5" name="CasellaDiTesto 4"/>
+          <p:cNvSpPr txBox="1"/>
+          <p:nvPr/>
+        </p:nvSpPr>
+        <p:spPr>
+          <a:xfrm>
+            <a:off x="1186249" y="3253380"/>
+            <a:ext cx="5636479" cy="923330"/>
+          </a:xfrm>
+          <a:prstGeom prst="rect">
+            <a:avLst/>
+          </a:prstGeom>
+          <a:noFill/>
+        </p:spPr>
+        <p:txBody>
+          <a:bodyPr wrap="none" rtlCol="0">
+            <a:spAutoFit/>
+          </a:bodyPr>
+          <a:lstStyle/>
+          <a:p>
+            <a:r>
+              <a:rPr lang="it-IT" b="1" dirty="0" smtClean="0"/>
+              <a:t>Differenze</a:t>
+            </a:r>
+            <a:r>
+              <a:rPr lang="it-IT" dirty="0" smtClean="0"/>
+              <a:t>:</a:t>
+            </a:r>
+          </a:p>
+          <a:p>
+            <a:pPr marL="285750" indent="-285750">
+              <a:buFont typeface="Arial" panose="020B0604020202020204" pitchFamily="34" charset="0"/>
+              <a:buChar char="•"/>
+            </a:pPr>
+            <a:r>
+              <a:rPr lang="it-IT" dirty="0" smtClean="0"/>
+              <a:t>RDG usa un </a:t>
+            </a:r>
+            <a:r>
+              <a:rPr lang="it-IT" b="1" dirty="0" smtClean="0"/>
+              <a:t>grafo</a:t>
+            </a:r>
+            <a:r>
+              <a:rPr lang="it-IT" dirty="0" smtClean="0"/>
+              <a:t> per considerare le distanze tra i punti</a:t>
+            </a:r>
+          </a:p>
+          <a:p>
+            <a:pPr marL="285750" indent="-285750">
+              <a:buFont typeface="Arial" panose="020B0604020202020204" pitchFamily="34" charset="0"/>
+              <a:buChar char="•"/>
+            </a:pPr>
+            <a:r>
+              <a:rPr lang="it-IT" dirty="0" smtClean="0"/>
+              <a:t>K-</a:t>
+            </a:r>
+            <a:r>
+              <a:rPr lang="it-IT" dirty="0" err="1" smtClean="0"/>
+              <a:t>means</a:t>
+            </a:r>
+            <a:r>
+              <a:rPr lang="it-IT" dirty="0" smtClean="0"/>
+              <a:t> ha elementi di </a:t>
+            </a:r>
+            <a:r>
+              <a:rPr lang="it-IT" b="1" dirty="0" smtClean="0"/>
+              <a:t>casualità</a:t>
+            </a:r>
+          </a:p>
+        </p:txBody>
+      </p:sp>
+    </p:spTree>
+    <p:extLst>
+      <p:ext uri="{BB962C8B-B14F-4D97-AF65-F5344CB8AC3E}">
+        <p14:creationId xmlns:p14="http://schemas.microsoft.com/office/powerpoint/2010/main" val="1283400112"/>
+      </p:ext>
+    </p:extLst>
+  </p:cSld>
+  <p:clrMapOvr>
+    <a:masterClrMapping/>
+  </p:clrMapOvr>
+</p:sld>
+</file>
+
+<file path=ppt/slides/slide13.xml><?xml version="1.0" encoding="utf-8"?>
+<p:sld xmlns:a="http://schemas.openxmlformats.org/drawingml/2006/main" xmlns:r="http://schemas.openxmlformats.org/officeDocument/2006/relationships" xmlns:p="http://schemas.openxmlformats.org/presentationml/2006/main">
+  <p:cSld>
+    <p:spTree>
+      <p:nvGrpSpPr>
+        <p:cNvPr id="1" name=""/>
+        <p:cNvGrpSpPr/>
+        <p:nvPr/>
+      </p:nvGrpSpPr>
+      <p:grpSpPr>
+        <a:xfrm>
+          <a:off x="0" y="0"/>
+          <a:ext cx="0" cy="0"/>
+          <a:chOff x="0" y="0"/>
+          <a:chExt cx="0" cy="0"/>
+        </a:xfrm>
+      </p:grpSpPr>
+      <p:sp>
+        <p:nvSpPr>
+          <p:cNvPr id="3" name="CasellaDiTesto 2"/>
+          <p:cNvSpPr txBox="1"/>
+          <p:nvPr/>
+        </p:nvSpPr>
+        <p:spPr>
+          <a:xfrm>
+            <a:off x="4818246" y="180000"/>
+            <a:ext cx="2555508" cy="523220"/>
+          </a:xfrm>
+          <a:prstGeom prst="rect">
+            <a:avLst/>
+          </a:prstGeom>
+          <a:noFill/>
+        </p:spPr>
+        <p:txBody>
+          <a:bodyPr wrap="none" rtlCol="0">
+            <a:spAutoFit/>
+          </a:bodyPr>
+          <a:lstStyle/>
+          <a:p>
+            <a:pPr algn="ctr"/>
+            <a:r>
+              <a:rPr lang="it-IT" sz="2800" dirty="0" smtClean="0"/>
+              <a:t>K-</a:t>
+            </a:r>
+            <a:r>
+              <a:rPr lang="it-IT" sz="2800" dirty="0" err="1" smtClean="0"/>
+              <a:t>means</a:t>
+            </a:r>
+            <a:r>
+              <a:rPr lang="it-IT" sz="2800" dirty="0" smtClean="0"/>
+              <a:t> vs RDG</a:t>
+            </a:r>
+            <a:endParaRPr lang="it-IT" sz="2800" dirty="0"/>
+          </a:p>
+        </p:txBody>
+      </p:sp>
+      <p:sp>
+        <p:nvSpPr>
+          <p:cNvPr id="4" name="CasellaDiTesto 3"/>
+          <p:cNvSpPr txBox="1"/>
+          <p:nvPr/>
+        </p:nvSpPr>
+        <p:spPr>
+          <a:xfrm>
+            <a:off x="475872" y="2136338"/>
+            <a:ext cx="5620128" cy="2862322"/>
+          </a:xfrm>
+          <a:prstGeom prst="rect">
+            <a:avLst/>
+          </a:prstGeom>
+          <a:noFill/>
+        </p:spPr>
+        <p:txBody>
+          <a:bodyPr wrap="none" rtlCol="0">
+            <a:spAutoFit/>
+          </a:bodyPr>
+          <a:lstStyle/>
+          <a:p>
+            <a:r>
+              <a:rPr lang="it-IT" dirty="0" smtClean="0"/>
+              <a:t>[pro e contro di entrambi]</a:t>
+            </a:r>
+          </a:p>
+          <a:p>
+            <a:r>
+              <a:rPr lang="it-IT" b="1" dirty="0" smtClean="0"/>
+              <a:t>Pro del k-</a:t>
+            </a:r>
+            <a:r>
+              <a:rPr lang="it-IT" b="1" dirty="0" err="1" smtClean="0"/>
+              <a:t>means</a:t>
+            </a:r>
+            <a:r>
+              <a:rPr lang="it-IT" dirty="0" smtClean="0"/>
+              <a:t>:</a:t>
+            </a:r>
+          </a:p>
+          <a:p>
+            <a:pPr marL="285750" indent="-285750">
+              <a:buFont typeface="Arial" panose="020B0604020202020204" pitchFamily="34" charset="0"/>
+              <a:buChar char="•"/>
+            </a:pPr>
+            <a:r>
+              <a:rPr lang="it-IT" b="1" dirty="0" smtClean="0"/>
+              <a:t>Semplice</a:t>
+            </a:r>
+            <a:r>
+              <a:rPr lang="it-IT" dirty="0" smtClean="0"/>
+              <a:t> da implementare</a:t>
+            </a:r>
+            <a:endParaRPr lang="it-IT" b="1" dirty="0" smtClean="0"/>
+          </a:p>
+          <a:p>
+            <a:pPr marL="285750" indent="-285750">
+              <a:buFont typeface="Arial" panose="020B0604020202020204" pitchFamily="34" charset="0"/>
+              <a:buChar char="•"/>
+            </a:pPr>
+            <a:r>
+              <a:rPr lang="it-IT" b="1" dirty="0" smtClean="0"/>
+              <a:t>Converge sempre </a:t>
+            </a:r>
+            <a:r>
+              <a:rPr lang="it-IT" dirty="0" smtClean="0"/>
+              <a:t>ad un </a:t>
+            </a:r>
+            <a:r>
+              <a:rPr lang="it-IT" b="1" dirty="0" smtClean="0"/>
+              <a:t>minimo locale </a:t>
+            </a:r>
+            <a:r>
+              <a:rPr lang="it-IT" dirty="0" smtClean="0"/>
+              <a:t>per ogni cluster</a:t>
+            </a:r>
+            <a:endParaRPr lang="it-IT" dirty="0"/>
+          </a:p>
+          <a:p>
+            <a:pPr marL="285750" indent="-285750">
+              <a:buFont typeface="Arial" panose="020B0604020202020204" pitchFamily="34" charset="0"/>
+              <a:buChar char="•"/>
+            </a:pPr>
+            <a:endParaRPr lang="it-IT" dirty="0" smtClean="0"/>
+          </a:p>
+          <a:p>
+            <a:r>
+              <a:rPr lang="it-IT" b="1" dirty="0"/>
+              <a:t>Contro del k-</a:t>
+            </a:r>
+            <a:r>
+              <a:rPr lang="it-IT" b="1" dirty="0" err="1"/>
+              <a:t>means</a:t>
+            </a:r>
+            <a:r>
+              <a:rPr lang="it-IT" dirty="0" smtClean="0"/>
+              <a:t>:</a:t>
+            </a:r>
+            <a:endParaRPr lang="it-IT" dirty="0"/>
+          </a:p>
+          <a:p>
+            <a:pPr marL="285750" indent="-285750">
+              <a:buFont typeface="Arial" panose="020B0604020202020204" pitchFamily="34" charset="0"/>
+              <a:buChar char="•"/>
+            </a:pPr>
+            <a:r>
+              <a:rPr lang="it-IT" dirty="0" smtClean="0"/>
+              <a:t>Perde l’</a:t>
+            </a:r>
+            <a:r>
+              <a:rPr lang="it-IT" b="1" dirty="0" smtClean="0"/>
+              <a:t>informazione spaziale</a:t>
+            </a:r>
+          </a:p>
+          <a:p>
+            <a:pPr marL="285750" indent="-285750">
+              <a:buFont typeface="Arial" panose="020B0604020202020204" pitchFamily="34" charset="0"/>
+              <a:buChar char="•"/>
+            </a:pPr>
+            <a:r>
+              <a:rPr lang="it-IT" dirty="0" smtClean="0"/>
+              <a:t>Impostare k è difficile</a:t>
+            </a:r>
+          </a:p>
+          <a:p>
+            <a:pPr marL="285750" indent="-285750">
+              <a:buFont typeface="Arial" panose="020B0604020202020204" pitchFamily="34" charset="0"/>
+              <a:buChar char="•"/>
+            </a:pPr>
+            <a:r>
+              <a:rPr lang="it-IT" dirty="0" smtClean="0"/>
+              <a:t>Sensibile ai centri iniziali </a:t>
+            </a:r>
+            <a:r>
+              <a:rPr lang="it-IT" b="1" dirty="0" smtClean="0"/>
+              <a:t>casuali</a:t>
+            </a:r>
+            <a:r>
+              <a:rPr lang="it-IT" dirty="0" smtClean="0"/>
+              <a:t> e al </a:t>
+            </a:r>
+            <a:r>
+              <a:rPr lang="it-IT" b="1" dirty="0" smtClean="0"/>
+              <a:t>rumore</a:t>
+            </a:r>
+          </a:p>
+          <a:p>
+            <a:pPr marL="285750" indent="-285750">
+              <a:buFont typeface="Arial" panose="020B0604020202020204" pitchFamily="34" charset="0"/>
+              <a:buChar char="•"/>
+            </a:pPr>
+            <a:r>
+              <a:rPr lang="it-IT" dirty="0" smtClean="0"/>
+              <a:t>Non modella bene la percezione umana</a:t>
+            </a:r>
+          </a:p>
+        </p:txBody>
+      </p:sp>
+      <p:sp>
+        <p:nvSpPr>
+          <p:cNvPr id="6" name="CasellaDiTesto 5"/>
+          <p:cNvSpPr txBox="1"/>
+          <p:nvPr/>
+        </p:nvSpPr>
+        <p:spPr>
+          <a:xfrm>
+            <a:off x="6268676" y="2136338"/>
+            <a:ext cx="4735271" cy="2031325"/>
+          </a:xfrm>
+          <a:prstGeom prst="rect">
+            <a:avLst/>
+          </a:prstGeom>
+          <a:noFill/>
+        </p:spPr>
+        <p:txBody>
+          <a:bodyPr wrap="none" rtlCol="0">
+            <a:spAutoFit/>
+          </a:bodyPr>
+          <a:lstStyle/>
+          <a:p>
+            <a:r>
+              <a:rPr lang="it-IT" dirty="0" smtClean="0"/>
+              <a:t>[pro e contro di entrambi]</a:t>
+            </a:r>
+          </a:p>
+          <a:p>
+            <a:r>
+              <a:rPr lang="it-IT" b="1" dirty="0" smtClean="0"/>
+              <a:t>Pro dell’RDG</a:t>
+            </a:r>
+            <a:r>
+              <a:rPr lang="it-IT" dirty="0" smtClean="0"/>
+              <a:t>:</a:t>
+            </a:r>
+          </a:p>
+          <a:p>
+            <a:pPr marL="285750" indent="-285750">
+              <a:buFont typeface="Arial" panose="020B0604020202020204" pitchFamily="34" charset="0"/>
+              <a:buChar char="•"/>
+            </a:pPr>
+            <a:r>
+              <a:rPr lang="it-IT" dirty="0" smtClean="0"/>
+              <a:t>Modella bene la percezione umana</a:t>
+            </a:r>
+          </a:p>
+          <a:p>
+            <a:pPr marL="285750" indent="-285750">
+              <a:buFont typeface="Arial" panose="020B0604020202020204" pitchFamily="34" charset="0"/>
+              <a:buChar char="•"/>
+            </a:pPr>
+            <a:r>
+              <a:rPr lang="it-IT" dirty="0" smtClean="0"/>
+              <a:t>Può trovare gruppi anche in </a:t>
+            </a:r>
+            <a:r>
+              <a:rPr lang="it-IT" b="1" dirty="0" smtClean="0"/>
+              <a:t>forme complesse</a:t>
+            </a:r>
+          </a:p>
+          <a:p>
+            <a:pPr marL="285750" indent="-285750">
+              <a:buFont typeface="Arial" panose="020B0604020202020204" pitchFamily="34" charset="0"/>
+              <a:buChar char="•"/>
+            </a:pPr>
+            <a:endParaRPr lang="it-IT" dirty="0" smtClean="0"/>
+          </a:p>
+          <a:p>
+            <a:r>
+              <a:rPr lang="it-IT" b="1" dirty="0"/>
+              <a:t>Contro </a:t>
+            </a:r>
+            <a:r>
+              <a:rPr lang="it-IT" b="1" dirty="0" smtClean="0"/>
+              <a:t>dell’RDG</a:t>
+            </a:r>
+            <a:r>
+              <a:rPr lang="it-IT" dirty="0" smtClean="0"/>
+              <a:t>:</a:t>
+            </a:r>
+            <a:endParaRPr lang="it-IT" dirty="0"/>
+          </a:p>
+          <a:p>
+            <a:pPr marL="285750" indent="-285750">
+              <a:buFont typeface="Arial" panose="020B0604020202020204" pitchFamily="34" charset="0"/>
+              <a:buChar char="•"/>
+            </a:pPr>
+            <a:r>
+              <a:rPr lang="it-IT" dirty="0" smtClean="0"/>
+              <a:t>Impostare il </a:t>
+            </a:r>
+            <a:r>
+              <a:rPr lang="it-IT" dirty="0" err="1" smtClean="0"/>
+              <a:t>threshold</a:t>
+            </a:r>
+            <a:r>
+              <a:rPr lang="it-IT" dirty="0" smtClean="0"/>
+              <a:t> è difficile</a:t>
+            </a:r>
+            <a:endParaRPr lang="it-IT" b="1" dirty="0" smtClean="0"/>
+          </a:p>
+        </p:txBody>
+      </p:sp>
+    </p:spTree>
+    <p:extLst>
+      <p:ext uri="{BB962C8B-B14F-4D97-AF65-F5344CB8AC3E}">
+        <p14:creationId xmlns:p14="http://schemas.microsoft.com/office/powerpoint/2010/main" val="1995222337"/>
+      </p:ext>
+    </p:extLst>
+  </p:cSld>
+  <p:clrMapOvr>
+    <a:masterClrMapping/>
+  </p:clrMapOvr>
+</p:sld>
+</file>
+
+<file path=ppt/slides/slide14.xml><?xml version="1.0" encoding="utf-8"?>
+<p:sld xmlns:a="http://schemas.openxmlformats.org/drawingml/2006/main" xmlns:r="http://schemas.openxmlformats.org/officeDocument/2006/relationships" xmlns:p="http://schemas.openxmlformats.org/presentationml/2006/main">
+  <p:cSld>
+    <p:spTree>
+      <p:nvGrpSpPr>
+        <p:cNvPr id="1" name=""/>
+        <p:cNvGrpSpPr/>
+        <p:nvPr/>
+      </p:nvGrpSpPr>
+      <p:grpSpPr>
+        <a:xfrm>
+          <a:off x="0" y="0"/>
+          <a:ext cx="0" cy="0"/>
+          <a:chOff x="0" y="0"/>
+          <a:chExt cx="0" cy="0"/>
+        </a:xfrm>
+      </p:grpSpPr>
+      <p:sp>
+        <p:nvSpPr>
+          <p:cNvPr id="3" name="CasellaDiTesto 2"/>
+          <p:cNvSpPr txBox="1"/>
+          <p:nvPr/>
+        </p:nvSpPr>
+        <p:spPr>
+          <a:xfrm>
+            <a:off x="1186249" y="1375719"/>
+            <a:ext cx="6014660" cy="369332"/>
+          </a:xfrm>
+          <a:prstGeom prst="rect">
+            <a:avLst/>
+          </a:prstGeom>
+          <a:noFill/>
+        </p:spPr>
+        <p:txBody>
+          <a:bodyPr wrap="none" rtlCol="0">
+            <a:spAutoFit/>
+          </a:bodyPr>
+          <a:lstStyle/>
+          <a:p>
             <a:r>
               <a:rPr lang="it-IT" dirty="0" smtClean="0"/>
               <a:t>[magari esporre l’esperimento che hanno compiuto nel </a:t>
@@ -3120,6 +4191,45 @@
               <a:t>]</a:t>
             </a:r>
             <a:endParaRPr lang="it-IT" dirty="0"/>
+          </a:p>
+        </p:txBody>
+      </p:sp>
+      <p:sp>
+        <p:nvSpPr>
+          <p:cNvPr id="4" name="CasellaDiTesto 3"/>
+          <p:cNvSpPr txBox="1"/>
+          <p:nvPr/>
+        </p:nvSpPr>
+        <p:spPr>
+          <a:xfrm>
+            <a:off x="4818246" y="180000"/>
+            <a:ext cx="2555508" cy="523220"/>
+          </a:xfrm>
+          <a:prstGeom prst="rect">
+            <a:avLst/>
+          </a:prstGeom>
+          <a:noFill/>
+        </p:spPr>
+        <p:txBody>
+          <a:bodyPr wrap="none" rtlCol="0">
+            <a:spAutoFit/>
+          </a:bodyPr>
+          <a:lstStyle/>
+          <a:p>
+            <a:pPr algn="ctr"/>
+            <a:r>
+              <a:rPr lang="it-IT" sz="2800" dirty="0" smtClean="0"/>
+              <a:t>K-</a:t>
+            </a:r>
+            <a:r>
+              <a:rPr lang="it-IT" sz="2800" dirty="0" err="1" smtClean="0"/>
+              <a:t>means</a:t>
+            </a:r>
+            <a:r>
+              <a:rPr lang="it-IT" sz="2800" dirty="0" smtClean="0"/>
+              <a:t> vs RDG</a:t>
+            </a:r>
+            <a:endParaRPr lang="it-IT" sz="2800" dirty="0"/>
           </a:p>
         </p:txBody>
       </p:sp>
@@ -3161,7 +4271,7 @@
         </p:nvSpPr>
         <p:spPr>
           <a:xfrm>
-            <a:off x="4761471" y="222422"/>
+            <a:off x="5091911" y="180000"/>
             <a:ext cx="2008178" cy="523220"/>
           </a:xfrm>
           <a:prstGeom prst="rect">
@@ -3175,6 +4285,7 @@
           </a:bodyPr>
           <a:lstStyle/>
           <a:p>
+            <a:pPr algn="ctr"/>
             <a:r>
               <a:rPr lang="it-IT" sz="2800" dirty="0" smtClean="0"/>
               <a:t>Dot </a:t>
@@ -3195,7 +4306,7 @@
         </p:nvSpPr>
         <p:spPr>
           <a:xfrm>
-            <a:off x="4644355" y="3130378"/>
+            <a:off x="4974795" y="2714945"/>
             <a:ext cx="2242409" cy="369332"/>
           </a:xfrm>
           <a:prstGeom prst="rect">
@@ -3227,6 +4338,13 @@
   <p:clrMapOvr>
     <a:masterClrMapping/>
   </p:clrMapOvr>
+  <p:timing>
+    <p:tnLst>
+      <p:par>
+        <p:cTn id="1" dur="indefinite" restart="never" nodeType="tmRoot"/>
+      </p:par>
+    </p:tnLst>
+  </p:timing>
 </p:sld>
 </file>
 
@@ -3255,8 +4373,8 @@
         </p:nvSpPr>
         <p:spPr>
           <a:xfrm>
-            <a:off x="3599936" y="148281"/>
-            <a:ext cx="4619663" cy="523220"/>
+            <a:off x="4680514" y="180000"/>
+            <a:ext cx="2830968" cy="523220"/>
           </a:xfrm>
           <a:prstGeom prst="rect">
             <a:avLst/>
@@ -3269,9 +4387,10 @@
           </a:bodyPr>
           <a:lstStyle/>
           <a:p>
+            <a:pPr algn="ctr"/>
             <a:r>
               <a:rPr lang="it-IT" sz="2800" dirty="0" smtClean="0"/>
-              <a:t>Legge della Gestalt: prossimità</a:t>
+              <a:t>Leggi della Gestalt</a:t>
             </a:r>
             <a:endParaRPr lang="it-IT" sz="2800" dirty="0"/>
           </a:p>
@@ -3279,44 +4398,110 @@
       </p:sp>
       <p:sp>
         <p:nvSpPr>
-          <p:cNvPr id="3" name="CasellaDiTesto 2"/>
-          <p:cNvSpPr txBox="1"/>
+          <p:cNvPr id="4" name="Rettangolo 3"/>
+          <p:cNvSpPr/>
           <p:nvPr/>
         </p:nvSpPr>
         <p:spPr>
           <a:xfrm>
-            <a:off x="1556951" y="5486400"/>
-            <a:ext cx="3848426" cy="369332"/>
+            <a:off x="1791902" y="766072"/>
+            <a:ext cx="8608193" cy="923330"/>
           </a:xfrm>
           <a:prstGeom prst="rect">
             <a:avLst/>
           </a:prstGeom>
-          <a:noFill/>
-        </p:spPr>
-        <p:txBody>
-          <a:bodyPr wrap="none" rtlCol="0">
+        </p:spPr>
+        <p:txBody>
+          <a:bodyPr wrap="square">
             <a:spAutoFit/>
           </a:bodyPr>
           <a:lstStyle/>
           <a:p>
             <a:r>
               <a:rPr lang="it-IT" dirty="0" smtClean="0"/>
-              <a:t>Vogliamo riprodurlo algoritmicamente!</a:t>
+              <a:t>La psicologia della Gestalt concerne la </a:t>
+            </a:r>
+            <a:r>
+              <a:rPr lang="it-IT" b="1" dirty="0" smtClean="0"/>
+              <a:t>forma</a:t>
+            </a:r>
+            <a:r>
+              <a:rPr lang="it-IT" dirty="0" smtClean="0"/>
+              <a:t> e la </a:t>
+            </a:r>
+            <a:r>
+              <a:rPr lang="it-IT" b="1" dirty="0" smtClean="0"/>
+              <a:t>rappresentazione</a:t>
+            </a:r>
+            <a:r>
+              <a:rPr lang="it-IT" dirty="0" smtClean="0"/>
+              <a:t> nel contesto del Sistema Visivo Umano.</a:t>
+            </a:r>
+          </a:p>
+          <a:p>
+            <a:r>
+              <a:rPr lang="it-IT" dirty="0" smtClean="0"/>
+              <a:t>Elementi in un gruppo possono avere proprietà che emergono da </a:t>
+            </a:r>
+            <a:r>
+              <a:rPr lang="it-IT" b="1" dirty="0" smtClean="0"/>
+              <a:t>relazioni reciproche</a:t>
+            </a:r>
+            <a:r>
+              <a:rPr lang="it-IT" dirty="0" smtClean="0"/>
+              <a:t>.</a:t>
             </a:r>
             <a:endParaRPr lang="it-IT" dirty="0"/>
           </a:p>
         </p:txBody>
       </p:sp>
+      <p:pic>
+        <p:nvPicPr>
+          <p:cNvPr id="6" name="Immagine 5"/>
+          <p:cNvPicPr>
+            <a:picLocks noChangeAspect="1"/>
+          </p:cNvPicPr>
+          <p:nvPr/>
+        </p:nvPicPr>
+        <p:blipFill>
+          <a:blip r:embed="rId2">
+            <a:extLst>
+              <a:ext uri="{28A0092B-C50C-407E-A947-70E740481C1C}">
+                <a14:useLocalDpi xmlns:a14="http://schemas.microsoft.com/office/drawing/2010/main" val="0"/>
+              </a:ext>
+            </a:extLst>
+          </a:blip>
+          <a:stretch>
+            <a:fillRect/>
+          </a:stretch>
+        </p:blipFill>
+        <p:spPr>
+          <a:xfrm>
+            <a:off x="1859477" y="1804200"/>
+            <a:ext cx="8473045" cy="4584244"/>
+          </a:xfrm>
+          <a:prstGeom prst="rect">
+            <a:avLst/>
+          </a:prstGeom>
+        </p:spPr>
+      </p:pic>
     </p:spTree>
     <p:extLst>
       <p:ext uri="{BB962C8B-B14F-4D97-AF65-F5344CB8AC3E}">
-        <p14:creationId xmlns:p14="http://schemas.microsoft.com/office/powerpoint/2010/main" val="3013941511"/>
+        <p14:creationId xmlns:p14="http://schemas.microsoft.com/office/powerpoint/2010/main" val="2346014920"/>
       </p:ext>
     </p:extLst>
   </p:cSld>
   <p:clrMapOvr>
     <a:masterClrMapping/>
   </p:clrMapOvr>
+  <p:timing>
+    <p:tnLst>
+      <p:par>
+        <p:cTn id="1" dur="indefinite" restart="never" nodeType="tmRoot"/>
+      </p:par>
+    </p:tnLst>
+  </p:timing>
 </p:sld>
 </file>
 
@@ -3339,14 +4524,14 @@
       </p:grpSpPr>
       <p:sp>
         <p:nvSpPr>
-          <p:cNvPr id="4" name="CasellaDiTesto 3"/>
+          <p:cNvPr id="2" name="CasellaDiTesto 1"/>
           <p:cNvSpPr txBox="1"/>
           <p:nvPr/>
         </p:nvSpPr>
         <p:spPr>
           <a:xfrm>
-            <a:off x="4292867" y="115504"/>
-            <a:ext cx="2948371" cy="523220"/>
+            <a:off x="3786168" y="180000"/>
+            <a:ext cx="4619663" cy="523220"/>
           </a:xfrm>
           <a:prstGeom prst="rect">
             <a:avLst/>
@@ -3359,21 +4544,10 @@
           </a:bodyPr>
           <a:lstStyle/>
           <a:p>
+            <a:pPr algn="ctr"/>
             <a:r>
               <a:rPr lang="it-IT" sz="2800" dirty="0" smtClean="0"/>
-              <a:t>K-</a:t>
-            </a:r>
-            <a:r>
-              <a:rPr lang="it-IT" sz="2800" dirty="0" err="1" smtClean="0"/>
-              <a:t>means</a:t>
-            </a:r>
-            <a:r>
-              <a:rPr lang="it-IT" sz="2800" dirty="0" smtClean="0"/>
-              <a:t> </a:t>
-            </a:r>
-            <a:r>
-              <a:rPr lang="it-IT" sz="2800" dirty="0" err="1" smtClean="0"/>
-              <a:t>clustering</a:t>
+              <a:t>Legge della Gestalt: prossimità</a:t>
             </a:r>
             <a:endParaRPr lang="it-IT" sz="2800" dirty="0"/>
           </a:p>
@@ -3381,14 +4555,14 @@
       </p:sp>
       <p:sp>
         <p:nvSpPr>
-          <p:cNvPr id="2" name="CasellaDiTesto 1"/>
+          <p:cNvPr id="3" name="CasellaDiTesto 2"/>
           <p:cNvSpPr txBox="1"/>
           <p:nvPr/>
         </p:nvSpPr>
         <p:spPr>
           <a:xfrm>
-            <a:off x="1861751" y="2108886"/>
-            <a:ext cx="2386102" cy="369332"/>
+            <a:off x="3160613" y="5563402"/>
+            <a:ext cx="5937331" cy="523220"/>
           </a:xfrm>
           <a:prstGeom prst="rect">
             <a:avLst/>
@@ -3402,23 +4576,116 @@
           <a:lstStyle/>
           <a:p>
             <a:r>
-              <a:rPr lang="it-IT" dirty="0" smtClean="0"/>
-              <a:t>[spiegazione algoritmo]</a:t>
-            </a:r>
-            <a:endParaRPr lang="it-IT" dirty="0"/>
-          </a:p>
-        </p:txBody>
-      </p:sp>
+              <a:rPr lang="it-IT" sz="2800" dirty="0" smtClean="0"/>
+              <a:t>Vogliamo riprodurlo </a:t>
+            </a:r>
+            <a:r>
+              <a:rPr lang="it-IT" sz="2800" b="1" dirty="0" smtClean="0"/>
+              <a:t>algoritmicamente</a:t>
+            </a:r>
+            <a:r>
+              <a:rPr lang="it-IT" sz="2800" dirty="0" smtClean="0"/>
+              <a:t>!</a:t>
+            </a:r>
+            <a:endParaRPr lang="it-IT" sz="2800" dirty="0"/>
+          </a:p>
+        </p:txBody>
+      </p:sp>
+      <p:sp>
+        <p:nvSpPr>
+          <p:cNvPr id="4" name="Rettangolo 3"/>
+          <p:cNvSpPr/>
+          <p:nvPr/>
+        </p:nvSpPr>
+        <p:spPr>
+          <a:xfrm>
+            <a:off x="1791902" y="766072"/>
+            <a:ext cx="8608193" cy="369332"/>
+          </a:xfrm>
+          <a:prstGeom prst="rect">
+            <a:avLst/>
+          </a:prstGeom>
+        </p:spPr>
+        <p:txBody>
+          <a:bodyPr wrap="square">
+            <a:spAutoFit/>
+          </a:bodyPr>
+          <a:lstStyle/>
+          <a:p>
+            <a:pPr algn="ctr"/>
+            <a:r>
+              <a:rPr lang="it-IT" dirty="0" smtClean="0"/>
+              <a:t>L'occhio </a:t>
+            </a:r>
+            <a:r>
+              <a:rPr lang="it-IT" dirty="0"/>
+              <a:t>umano tende a </a:t>
+            </a:r>
+            <a:r>
+              <a:rPr lang="it-IT" b="1" dirty="0"/>
+              <a:t>raggruppare</a:t>
+            </a:r>
+            <a:r>
+              <a:rPr lang="it-IT" dirty="0"/>
+              <a:t> gli elementi </a:t>
+            </a:r>
+            <a:r>
+              <a:rPr lang="it-IT" b="1" dirty="0"/>
+              <a:t>vicini</a:t>
+            </a:r>
+            <a:r>
+              <a:rPr lang="it-IT" dirty="0"/>
+              <a:t>, separandoli da quelli più lontani.</a:t>
+            </a:r>
+          </a:p>
+        </p:txBody>
+      </p:sp>
+      <p:pic>
+        <p:nvPicPr>
+          <p:cNvPr id="5" name="Immagine 4"/>
+          <p:cNvPicPr>
+            <a:picLocks noChangeAspect="1"/>
+          </p:cNvPicPr>
+          <p:nvPr/>
+        </p:nvPicPr>
+        <p:blipFill rotWithShape="1">
+          <a:blip r:embed="rId2">
+            <a:extLst>
+              <a:ext uri="{28A0092B-C50C-407E-A947-70E740481C1C}">
+                <a14:useLocalDpi xmlns:a14="http://schemas.microsoft.com/office/drawing/2010/main" val="0"/>
+              </a:ext>
+            </a:extLst>
+          </a:blip>
+          <a:srcRect t="24196" b="23282"/>
+          <a:stretch/>
+        </p:blipFill>
+        <p:spPr>
+          <a:xfrm>
+            <a:off x="1399040" y="1365001"/>
+            <a:ext cx="9393920" cy="3703365"/>
+          </a:xfrm>
+          <a:prstGeom prst="rect">
+            <a:avLst/>
+          </a:prstGeom>
+        </p:spPr>
+      </p:pic>
     </p:spTree>
     <p:extLst>
       <p:ext uri="{BB962C8B-B14F-4D97-AF65-F5344CB8AC3E}">
-        <p14:creationId xmlns:p14="http://schemas.microsoft.com/office/powerpoint/2010/main" val="4024441884"/>
+        <p14:creationId xmlns:p14="http://schemas.microsoft.com/office/powerpoint/2010/main" val="3013941511"/>
       </p:ext>
     </p:extLst>
   </p:cSld>
   <p:clrMapOvr>
     <a:masterClrMapping/>
   </p:clrMapOvr>
+  <p:timing>
+    <p:tnLst>
+      <p:par>
+        <p:cTn id="1" dur="indefinite" restart="never" nodeType="tmRoot"/>
+      </p:par>
+    </p:tnLst>
+  </p:timing>
 </p:sld>
 </file>
 
@@ -3447,8 +4714,8 @@
         </p:nvSpPr>
         <p:spPr>
           <a:xfrm>
-            <a:off x="4292867" y="115504"/>
-            <a:ext cx="2948371" cy="523220"/>
+            <a:off x="2718416" y="180000"/>
+            <a:ext cx="6755184" cy="523220"/>
           </a:xfrm>
           <a:prstGeom prst="rect">
             <a:avLst/>
@@ -3461,36 +4728,302 @@
           </a:bodyPr>
           <a:lstStyle/>
           <a:p>
+            <a:pPr algn="ctr"/>
             <a:r>
               <a:rPr lang="it-IT" sz="2800" dirty="0" smtClean="0"/>
-              <a:t>K-</a:t>
-            </a:r>
-            <a:r>
-              <a:rPr lang="it-IT" sz="2800" dirty="0" err="1" smtClean="0"/>
+              <a:t>Un modo per modellare la Gestalt: Clustering</a:t>
+            </a:r>
+            <a:endParaRPr lang="it-IT" sz="2800" dirty="0"/>
+          </a:p>
+        </p:txBody>
+      </p:sp>
+      <p:sp>
+        <p:nvSpPr>
+          <p:cNvPr id="4" name="Rettangolo 3"/>
+          <p:cNvSpPr/>
+          <p:nvPr/>
+        </p:nvSpPr>
+        <p:spPr>
+          <a:xfrm>
+            <a:off x="627244" y="1116028"/>
+            <a:ext cx="5468754" cy="5078313"/>
+          </a:xfrm>
+          <a:prstGeom prst="rect">
+            <a:avLst/>
+          </a:prstGeom>
+        </p:spPr>
+        <p:txBody>
+          <a:bodyPr wrap="square">
+            <a:spAutoFit/>
+          </a:bodyPr>
+          <a:lstStyle/>
+          <a:p>
+            <a:pPr algn="just"/>
+            <a:r>
+              <a:rPr lang="it-IT" dirty="0" smtClean="0"/>
+              <a:t>Il </a:t>
+            </a:r>
+            <a:r>
+              <a:rPr lang="it-IT" b="1" dirty="0" err="1" smtClean="0"/>
+              <a:t>clustering</a:t>
+            </a:r>
+            <a:r>
+              <a:rPr lang="it-IT" dirty="0" smtClean="0"/>
+              <a:t> è quell’insieme di tecniche volte </a:t>
+            </a:r>
+            <a:r>
+              <a:rPr lang="it-IT" dirty="0"/>
+              <a:t>alla selezione e </a:t>
+            </a:r>
+            <a:r>
+              <a:rPr lang="it-IT" b="1" dirty="0"/>
+              <a:t>raggruppamento</a:t>
+            </a:r>
+            <a:r>
+              <a:rPr lang="it-IT" dirty="0"/>
+              <a:t> di </a:t>
+            </a:r>
+            <a:r>
+              <a:rPr lang="it-IT" b="1" dirty="0"/>
+              <a:t>elementi omogenei </a:t>
+            </a:r>
+            <a:r>
+              <a:rPr lang="it-IT" dirty="0"/>
+              <a:t>in un insieme di dati</a:t>
+            </a:r>
+            <a:r>
+              <a:rPr lang="it-IT" dirty="0" smtClean="0"/>
+              <a:t>.</a:t>
+            </a:r>
+          </a:p>
+          <a:p>
+            <a:pPr algn="just"/>
+            <a:endParaRPr lang="it-IT" dirty="0" smtClean="0"/>
+          </a:p>
+          <a:p>
+            <a:pPr algn="just"/>
+            <a:r>
+              <a:rPr lang="it-IT" dirty="0" smtClean="0"/>
+              <a:t>Tipologie:</a:t>
+            </a:r>
+          </a:p>
+          <a:p>
+            <a:pPr marL="285750" indent="-285750" algn="just">
+              <a:buFont typeface="Arial" panose="020B0604020202020204" pitchFamily="34" charset="0"/>
+              <a:buChar char="•"/>
+            </a:pPr>
+            <a:r>
+              <a:rPr lang="it-IT" b="1" dirty="0" smtClean="0"/>
+              <a:t>Clustering esclusivo </a:t>
+            </a:r>
+            <a:r>
+              <a:rPr lang="it-IT" dirty="0" smtClean="0"/>
+              <a:t>(o hard </a:t>
+            </a:r>
+            <a:r>
+              <a:rPr lang="it-IT" dirty="0" err="1" smtClean="0"/>
+              <a:t>clustering</a:t>
+            </a:r>
+            <a:r>
+              <a:rPr lang="it-IT" dirty="0" smtClean="0"/>
+              <a:t>): ogni elemento è assegnato ad uno e un solo cluster.</a:t>
+            </a:r>
+          </a:p>
+          <a:p>
+            <a:pPr marL="285750" indent="-285750" algn="just">
+              <a:buFont typeface="Arial" panose="020B0604020202020204" pitchFamily="34" charset="0"/>
+              <a:buChar char="•"/>
+            </a:pPr>
+            <a:r>
+              <a:rPr lang="it-IT" b="1" dirty="0" smtClean="0"/>
+              <a:t>Clustering non-esclusivo</a:t>
+            </a:r>
+            <a:r>
+              <a:rPr lang="it-IT" dirty="0" smtClean="0"/>
+              <a:t> (o soft/</a:t>
+            </a:r>
+            <a:r>
+              <a:rPr lang="it-IT" dirty="0" err="1" smtClean="0"/>
+              <a:t>fuzzy</a:t>
+            </a:r>
+            <a:r>
+              <a:rPr lang="it-IT" dirty="0" smtClean="0"/>
+              <a:t> </a:t>
+            </a:r>
+            <a:r>
+              <a:rPr lang="it-IT" dirty="0" err="1" smtClean="0"/>
+              <a:t>clustering</a:t>
+            </a:r>
+            <a:r>
+              <a:rPr lang="it-IT" dirty="0" smtClean="0"/>
+              <a:t>): </a:t>
+            </a:r>
+            <a:r>
+              <a:rPr lang="it-IT" dirty="0"/>
+              <a:t>un elemento può appartenere a più cluster con gradi di appartenenza </a:t>
+            </a:r>
+            <a:r>
+              <a:rPr lang="it-IT" dirty="0" smtClean="0"/>
+              <a:t>diversi.</a:t>
+            </a:r>
+          </a:p>
+          <a:p>
+            <a:pPr marL="285750" indent="-285750" algn="just">
+              <a:buFont typeface="Arial" panose="020B0604020202020204" pitchFamily="34" charset="0"/>
+              <a:buChar char="•"/>
+            </a:pPr>
+            <a:endParaRPr lang="it-IT" dirty="0"/>
+          </a:p>
+          <a:p>
+            <a:pPr marL="285750" indent="-285750" algn="just">
+              <a:buFont typeface="Arial" panose="020B0604020202020204" pitchFamily="34" charset="0"/>
+              <a:buChar char="•"/>
+            </a:pPr>
+            <a:r>
+              <a:rPr lang="it-IT" b="1" dirty="0" smtClean="0"/>
+              <a:t>Clustering partizionale </a:t>
+            </a:r>
+            <a:r>
+              <a:rPr lang="it-IT" dirty="0" smtClean="0"/>
+              <a:t>(o non gerarchico o k-</a:t>
+            </a:r>
+            <a:r>
+              <a:rPr lang="it-IT" dirty="0" err="1" smtClean="0"/>
+              <a:t>clustering</a:t>
+            </a:r>
+            <a:r>
+              <a:rPr lang="it-IT" dirty="0" smtClean="0"/>
+              <a:t>): </a:t>
+            </a:r>
+            <a:r>
+              <a:rPr lang="it-IT" dirty="0"/>
+              <a:t>l'appartenenza ad un gruppo viene </a:t>
+            </a:r>
+            <a:r>
+              <a:rPr lang="it-IT" dirty="0" smtClean="0"/>
+              <a:t>data da una </a:t>
+            </a:r>
+            <a:r>
+              <a:rPr lang="it-IT" dirty="0"/>
+              <a:t>distanza da un punto </a:t>
+            </a:r>
+            <a:r>
+              <a:rPr lang="it-IT" dirty="0" smtClean="0"/>
+              <a:t>rappresentativo. Esempio: </a:t>
+            </a:r>
+            <a:r>
+              <a:rPr lang="it-IT" b="1" dirty="0" smtClean="0"/>
+              <a:t>k-</a:t>
+            </a:r>
+            <a:r>
+              <a:rPr lang="it-IT" b="1" dirty="0" err="1" smtClean="0"/>
               <a:t>means</a:t>
             </a:r>
             <a:r>
-              <a:rPr lang="it-IT" sz="2800" dirty="0" smtClean="0"/>
-              <a:t> </a:t>
-            </a:r>
-            <a:r>
-              <a:rPr lang="it-IT" sz="2800" dirty="0" err="1" smtClean="0"/>
-              <a:t>clustering</a:t>
-            </a:r>
-            <a:endParaRPr lang="it-IT" sz="2800" dirty="0"/>
-          </a:p>
-        </p:txBody>
-      </p:sp>
-      <p:sp>
-        <p:nvSpPr>
-          <p:cNvPr id="3" name="CasellaDiTesto 2"/>
+              <a:rPr lang="it-IT" dirty="0" smtClean="0"/>
+              <a:t>.</a:t>
+            </a:r>
+          </a:p>
+          <a:p>
+            <a:pPr marL="285750" indent="-285750" algn="just">
+              <a:buFont typeface="Arial" panose="020B0604020202020204" pitchFamily="34" charset="0"/>
+              <a:buChar char="•"/>
+            </a:pPr>
+            <a:r>
+              <a:rPr lang="it-IT" b="1" dirty="0" smtClean="0"/>
+              <a:t>Clustering gerarchico</a:t>
+            </a:r>
+            <a:r>
+              <a:rPr lang="it-IT" dirty="0" smtClean="0"/>
+              <a:t>: presenta una </a:t>
+            </a:r>
+            <a:r>
+              <a:rPr lang="it-IT" dirty="0"/>
+              <a:t>gerarchia di partizioni caratterizzate da un numero (de)crescente di </a:t>
+            </a:r>
+            <a:r>
+              <a:rPr lang="it-IT" dirty="0" smtClean="0"/>
+              <a:t>gruppi.</a:t>
+            </a:r>
+          </a:p>
+        </p:txBody>
+      </p:sp>
+      <p:pic>
+        <p:nvPicPr>
+          <p:cNvPr id="6" name="Immagine 5"/>
+          <p:cNvPicPr>
+            <a:picLocks noChangeAspect="1"/>
+          </p:cNvPicPr>
+          <p:nvPr/>
+        </p:nvPicPr>
+        <p:blipFill rotWithShape="1">
+          <a:blip r:embed="rId2">
+            <a:extLst>
+              <a:ext uri="{28A0092B-C50C-407E-A947-70E740481C1C}">
+                <a14:useLocalDpi xmlns:a14="http://schemas.microsoft.com/office/drawing/2010/main" val="0"/>
+              </a:ext>
+            </a:extLst>
+          </a:blip>
+          <a:srcRect l="1428" t="2667" r="2526" b="772"/>
+          <a:stretch/>
+        </p:blipFill>
+        <p:spPr>
+          <a:xfrm>
+            <a:off x="6916960" y="856648"/>
+            <a:ext cx="4614105" cy="5597074"/>
+          </a:xfrm>
+          <a:prstGeom prst="rect">
+            <a:avLst/>
+          </a:prstGeom>
+        </p:spPr>
+      </p:pic>
+    </p:spTree>
+    <p:extLst>
+      <p:ext uri="{BB962C8B-B14F-4D97-AF65-F5344CB8AC3E}">
+        <p14:creationId xmlns:p14="http://schemas.microsoft.com/office/powerpoint/2010/main" val="2953150164"/>
+      </p:ext>
+    </p:extLst>
+  </p:cSld>
+  <p:clrMapOvr>
+    <a:masterClrMapping/>
+  </p:clrMapOvr>
+  <p:timing>
+    <p:tnLst>
+      <p:par>
+        <p:cTn id="1" dur="indefinite" restart="never" nodeType="tmRoot"/>
+      </p:par>
+    </p:tnLst>
+  </p:timing>
+</p:sld>
+</file>
+
+<file path=ppt/slides/slide6.xml><?xml version="1.0" encoding="utf-8"?>
+<p:sld xmlns:a="http://schemas.openxmlformats.org/drawingml/2006/main" xmlns:r="http://schemas.openxmlformats.org/officeDocument/2006/relationships" xmlns:p="http://schemas.openxmlformats.org/presentationml/2006/main">
+  <p:cSld>
+    <p:spTree>
+      <p:nvGrpSpPr>
+        <p:cNvPr id="1" name=""/>
+        <p:cNvGrpSpPr/>
+        <p:nvPr/>
+      </p:nvGrpSpPr>
+      <p:grpSpPr>
+        <a:xfrm>
+          <a:off x="0" y="0"/>
+          <a:ext cx="0" cy="0"/>
+          <a:chOff x="0" y="0"/>
+          <a:chExt cx="0" cy="0"/>
+        </a:xfrm>
+      </p:grpSpPr>
+      <p:sp>
+        <p:nvSpPr>
+          <p:cNvPr id="2" name="CasellaDiTesto 1"/>
           <p:cNvSpPr txBox="1"/>
           <p:nvPr/>
         </p:nvSpPr>
         <p:spPr>
           <a:xfrm>
-            <a:off x="1799966" y="1359243"/>
-            <a:ext cx="1194558" cy="369332"/>
+            <a:off x="1303485" y="1069358"/>
+            <a:ext cx="9736691" cy="1477328"/>
           </a:xfrm>
           <a:prstGeom prst="rect">
             <a:avLst/>
@@ -3498,29 +5031,92 @@
           <a:noFill/>
         </p:spPr>
         <p:txBody>
-          <a:bodyPr wrap="none" rtlCol="0">
+          <a:bodyPr wrap="square" rtlCol="0">
             <a:spAutoFit/>
           </a:bodyPr>
           <a:lstStyle/>
           <a:p>
             <a:r>
               <a:rPr lang="it-IT" dirty="0" smtClean="0"/>
-              <a:t>[immagini]</a:t>
-            </a:r>
+              <a:t>Una prima idea è usare l’algoritmo </a:t>
+            </a:r>
+            <a:r>
+              <a:rPr lang="it-IT" b="1" dirty="0" smtClean="0"/>
+              <a:t>k-</a:t>
+            </a:r>
+            <a:r>
+              <a:rPr lang="it-IT" b="1" dirty="0" err="1" smtClean="0"/>
+              <a:t>means</a:t>
+            </a:r>
+            <a:r>
+              <a:rPr lang="it-IT" dirty="0" smtClean="0"/>
+              <a:t>.</a:t>
+            </a:r>
+          </a:p>
+          <a:p>
             <a:endParaRPr lang="it-IT" dirty="0"/>
           </a:p>
-        </p:txBody>
-      </p:sp>
-      <p:sp>
-        <p:nvSpPr>
-          <p:cNvPr id="4" name="CasellaDiTesto 3"/>
+          <a:p>
+            <a:r>
+              <a:rPr lang="it-IT" b="1" dirty="0" smtClean="0"/>
+              <a:t>Input</a:t>
+            </a:r>
+            <a:r>
+              <a:rPr lang="it-IT" dirty="0" smtClean="0"/>
+              <a:t>: </a:t>
+            </a:r>
+            <a:r>
+              <a:rPr lang="it-IT" dirty="0"/>
+              <a:t>un array di punti nel piano caratterizzati da una coppia di coordinate [</a:t>
+            </a:r>
+            <a:r>
+              <a:rPr lang="it-IT" dirty="0" err="1" smtClean="0"/>
+              <a:t>x,y</a:t>
+            </a:r>
+            <a:r>
+              <a:rPr lang="it-IT" dirty="0" smtClean="0"/>
+              <a:t>] e </a:t>
+            </a:r>
+            <a:r>
+              <a:rPr lang="it-IT" dirty="0" err="1" smtClean="0"/>
+              <a:t>ilnumero</a:t>
+            </a:r>
+            <a:r>
+              <a:rPr lang="it-IT" dirty="0" smtClean="0"/>
+              <a:t> k di cluster.</a:t>
+            </a:r>
+          </a:p>
+          <a:p>
+            <a:r>
+              <a:rPr lang="it-IT" b="1" dirty="0" smtClean="0"/>
+              <a:t>Output ed effetti</a:t>
+            </a:r>
+            <a:r>
+              <a:rPr lang="it-IT" dirty="0" smtClean="0"/>
+              <a:t> (tipicamente): le coordinate dei </a:t>
+            </a:r>
+            <a:r>
+              <a:rPr lang="it-IT" dirty="0" err="1" smtClean="0"/>
+              <a:t>centroidi</a:t>
+            </a:r>
+            <a:r>
+              <a:rPr lang="it-IT" dirty="0" smtClean="0"/>
+              <a:t> per ogni cluster e assegnamento di ogni punto in input ad un cluster.</a:t>
+            </a:r>
+            <a:endParaRPr lang="it-IT" b="1" dirty="0"/>
+          </a:p>
+        </p:txBody>
+      </p:sp>
+      <p:sp>
+        <p:nvSpPr>
+          <p:cNvPr id="5" name="CasellaDiTesto 4"/>
           <p:cNvSpPr txBox="1"/>
           <p:nvPr/>
         </p:nvSpPr>
         <p:spPr>
           <a:xfrm>
-            <a:off x="1799966" y="5350475"/>
-            <a:ext cx="4300665" cy="369332"/>
+            <a:off x="4621814" y="180000"/>
+            <a:ext cx="2948372" cy="523220"/>
           </a:xfrm>
           <a:prstGeom prst="rect">
             <a:avLst/>
@@ -3533,11 +5129,396 @@
           </a:bodyPr>
           <a:lstStyle/>
           <a:p>
+            <a:pPr algn="ctr"/>
+            <a:r>
+              <a:rPr lang="it-IT" sz="2800" dirty="0" smtClean="0"/>
+              <a:t>K-</a:t>
+            </a:r>
+            <a:r>
+              <a:rPr lang="it-IT" sz="2800" dirty="0" err="1" smtClean="0"/>
+              <a:t>means</a:t>
+            </a:r>
+            <a:r>
+              <a:rPr lang="it-IT" sz="2800" dirty="0" smtClean="0"/>
+              <a:t> </a:t>
+            </a:r>
+            <a:r>
+              <a:rPr lang="it-IT" sz="2800" dirty="0" err="1" smtClean="0"/>
+              <a:t>clustering</a:t>
+            </a:r>
+            <a:endParaRPr lang="it-IT" sz="2800" dirty="0"/>
+          </a:p>
+        </p:txBody>
+      </p:sp>
+      <p:sp>
+        <p:nvSpPr>
+          <p:cNvPr id="6" name="CasellaDiTesto 5"/>
+          <p:cNvSpPr txBox="1"/>
+          <p:nvPr/>
+        </p:nvSpPr>
+        <p:spPr>
+          <a:xfrm>
+            <a:off x="1303485" y="3059668"/>
+            <a:ext cx="4573944" cy="369332"/>
+          </a:xfrm>
+          <a:prstGeom prst="rect">
+            <a:avLst/>
+          </a:prstGeom>
+          <a:noFill/>
+        </p:spPr>
+        <p:txBody>
+          <a:bodyPr wrap="none" rtlCol="0">
+            <a:spAutoFit/>
+          </a:bodyPr>
+          <a:lstStyle/>
+          <a:p>
+            <a:r>
+              <a:rPr lang="it-IT" dirty="0" smtClean="0"/>
+              <a:t>1. Inizializzare </a:t>
+            </a:r>
+            <a:r>
+              <a:rPr lang="it-IT" b="1" dirty="0" smtClean="0"/>
+              <a:t>casualmente</a:t>
+            </a:r>
+            <a:r>
+              <a:rPr lang="it-IT" dirty="0" smtClean="0"/>
+              <a:t> k </a:t>
+            </a:r>
+            <a:r>
+              <a:rPr lang="it-IT" dirty="0" err="1" smtClean="0"/>
+              <a:t>centroidi</a:t>
+            </a:r>
+            <a:r>
+              <a:rPr lang="it-IT" dirty="0" smtClean="0"/>
+              <a:t> c</a:t>
+            </a:r>
+            <a:r>
+              <a:rPr lang="it-IT" baseline="-25000" dirty="0" smtClean="0"/>
+              <a:t>1</a:t>
+            </a:r>
+            <a:r>
+              <a:rPr lang="it-IT" dirty="0" smtClean="0"/>
+              <a:t>, …, </a:t>
+            </a:r>
+            <a:r>
+              <a:rPr lang="it-IT" dirty="0" err="1" smtClean="0"/>
+              <a:t>c</a:t>
+            </a:r>
+            <a:r>
+              <a:rPr lang="it-IT" baseline="-25000" dirty="0" err="1" smtClean="0"/>
+              <a:t>k</a:t>
+            </a:r>
+            <a:endParaRPr lang="it-IT" baseline="-25000" dirty="0" smtClean="0"/>
+          </a:p>
+        </p:txBody>
+      </p:sp>
+      <p:sp>
+        <p:nvSpPr>
+          <p:cNvPr id="3" name="Rettangolo 2"/>
+          <p:cNvSpPr/>
+          <p:nvPr/>
+        </p:nvSpPr>
+        <p:spPr>
+          <a:xfrm>
+            <a:off x="1303485" y="3429000"/>
+            <a:ext cx="6096000" cy="923330"/>
+          </a:xfrm>
+          <a:prstGeom prst="rect">
+            <a:avLst/>
+          </a:prstGeom>
+        </p:spPr>
+        <p:txBody>
+          <a:bodyPr>
+            <a:spAutoFit/>
+          </a:bodyPr>
+          <a:lstStyle/>
+          <a:p>
+            <a:r>
+              <a:rPr lang="it-IT" dirty="0" smtClean="0"/>
+              <a:t>2. Dati </a:t>
+            </a:r>
+            <a:r>
+              <a:rPr lang="it-IT" dirty="0"/>
+              <a:t>i </a:t>
+            </a:r>
+            <a:r>
+              <a:rPr lang="it-IT" dirty="0" err="1"/>
+              <a:t>centroidi</a:t>
+            </a:r>
+            <a:r>
+              <a:rPr lang="it-IT" dirty="0"/>
+              <a:t> trova i punti per ogni cluster:</a:t>
+            </a:r>
+          </a:p>
+          <a:p>
+            <a:pPr marL="800100" lvl="1" indent="-342900">
+              <a:buFont typeface="+mj-lt"/>
+              <a:buAutoNum type="alphaLcParenR"/>
+            </a:pPr>
+            <a:r>
+              <a:rPr lang="it-IT" dirty="0"/>
+              <a:t>Per ogni punto p trovare il c</a:t>
+            </a:r>
+            <a:r>
+              <a:rPr lang="it-IT" baseline="-25000" dirty="0"/>
+              <a:t>i</a:t>
+            </a:r>
+            <a:r>
+              <a:rPr lang="it-IT" dirty="0"/>
+              <a:t> più vicino</a:t>
+            </a:r>
+          </a:p>
+          <a:p>
+            <a:pPr marL="800100" lvl="1" indent="-342900">
+              <a:buFont typeface="+mj-lt"/>
+              <a:buAutoNum type="alphaLcParenR"/>
+            </a:pPr>
+            <a:r>
+              <a:rPr lang="it-IT" dirty="0"/>
+              <a:t>Mettere p nel cluster </a:t>
+            </a:r>
+            <a:r>
+              <a:rPr lang="it-IT" dirty="0" smtClean="0"/>
+              <a:t>i</a:t>
+            </a:r>
+            <a:endParaRPr lang="it-IT" dirty="0"/>
+          </a:p>
+        </p:txBody>
+      </p:sp>
+      <p:sp>
+        <p:nvSpPr>
+          <p:cNvPr id="7" name="Rettangolo 6"/>
+          <p:cNvSpPr/>
+          <p:nvPr/>
+        </p:nvSpPr>
+        <p:spPr>
+          <a:xfrm>
+            <a:off x="1303485" y="4349136"/>
+            <a:ext cx="8793416" cy="369332"/>
+          </a:xfrm>
+          <a:prstGeom prst="rect">
+            <a:avLst/>
+          </a:prstGeom>
+        </p:spPr>
+        <p:txBody>
+          <a:bodyPr wrap="square">
+            <a:spAutoFit/>
+          </a:bodyPr>
+          <a:lstStyle/>
+          <a:p>
+            <a:r>
+              <a:rPr lang="it-IT" dirty="0" smtClean="0"/>
+              <a:t>3. Dati </a:t>
+            </a:r>
+            <a:r>
+              <a:rPr lang="it-IT" dirty="0"/>
+              <a:t>i punti trovati in ogni cluster, trovare c</a:t>
+            </a:r>
+            <a:r>
+              <a:rPr lang="it-IT" baseline="-25000" dirty="0"/>
+              <a:t>i</a:t>
+            </a:r>
+            <a:r>
+              <a:rPr lang="it-IT" dirty="0"/>
+              <a:t> e settare c</a:t>
+            </a:r>
+            <a:r>
+              <a:rPr lang="it-IT" baseline="-25000" dirty="0"/>
+              <a:t>i</a:t>
+            </a:r>
+            <a:r>
+              <a:rPr lang="it-IT" dirty="0"/>
+              <a:t> come media dei punti del cluster </a:t>
+            </a:r>
+            <a:r>
+              <a:rPr lang="it-IT" dirty="0" smtClean="0"/>
+              <a:t>i</a:t>
+            </a:r>
+          </a:p>
+        </p:txBody>
+      </p:sp>
+      <p:sp>
+        <p:nvSpPr>
+          <p:cNvPr id="8" name="Rettangolo 7"/>
+          <p:cNvSpPr/>
+          <p:nvPr/>
+        </p:nvSpPr>
+        <p:spPr>
+          <a:xfrm>
+            <a:off x="1303485" y="4718468"/>
+            <a:ext cx="6723123" cy="369332"/>
+          </a:xfrm>
+          <a:prstGeom prst="rect">
+            <a:avLst/>
+          </a:prstGeom>
+        </p:spPr>
+        <p:txBody>
+          <a:bodyPr wrap="none">
+            <a:spAutoFit/>
+          </a:bodyPr>
+          <a:lstStyle/>
+          <a:p>
+            <a:r>
+              <a:rPr lang="it-IT" dirty="0" smtClean="0"/>
+              <a:t>4. Se </a:t>
+            </a:r>
+            <a:r>
+              <a:rPr lang="it-IT" dirty="0"/>
+              <a:t>c</a:t>
+            </a:r>
+            <a:r>
+              <a:rPr lang="it-IT" baseline="-25000" dirty="0"/>
+              <a:t>i</a:t>
+            </a:r>
+            <a:r>
+              <a:rPr lang="it-IT" dirty="0"/>
+              <a:t> è cambiato rispetto al corrente tornare 2. </a:t>
+            </a:r>
+            <a:r>
+              <a:rPr lang="it-IT" dirty="0" smtClean="0"/>
+              <a:t>altrimenti terminare</a:t>
+            </a:r>
+            <a:endParaRPr lang="it-IT" dirty="0"/>
+          </a:p>
+        </p:txBody>
+      </p:sp>
+    </p:spTree>
+    <p:extLst>
+      <p:ext uri="{BB962C8B-B14F-4D97-AF65-F5344CB8AC3E}">
+        <p14:creationId xmlns:p14="http://schemas.microsoft.com/office/powerpoint/2010/main" val="4024441884"/>
+      </p:ext>
+    </p:extLst>
+  </p:cSld>
+  <p:clrMapOvr>
+    <a:masterClrMapping/>
+  </p:clrMapOvr>
+  <p:timing>
+    <p:tnLst>
+      <p:par>
+        <p:cTn id="1" dur="indefinite" restart="never" nodeType="tmRoot"/>
+      </p:par>
+    </p:tnLst>
+  </p:timing>
+</p:sld>
+</file>
+
+<file path=ppt/slides/slide7.xml><?xml version="1.0" encoding="utf-8"?>
+<p:sld xmlns:a="http://schemas.openxmlformats.org/drawingml/2006/main" xmlns:r="http://schemas.openxmlformats.org/officeDocument/2006/relationships" xmlns:p="http://schemas.openxmlformats.org/presentationml/2006/main">
+  <p:cSld>
+    <p:spTree>
+      <p:nvGrpSpPr>
+        <p:cNvPr id="1" name=""/>
+        <p:cNvGrpSpPr/>
+        <p:nvPr/>
+      </p:nvGrpSpPr>
+      <p:grpSpPr>
+        <a:xfrm>
+          <a:off x="0" y="0"/>
+          <a:ext cx="0" cy="0"/>
+          <a:chOff x="0" y="0"/>
+          <a:chExt cx="0" cy="0"/>
+        </a:xfrm>
+      </p:grpSpPr>
+      <p:sp>
+        <p:nvSpPr>
+          <p:cNvPr id="3" name="CasellaDiTesto 2"/>
+          <p:cNvSpPr txBox="1"/>
+          <p:nvPr/>
+        </p:nvSpPr>
+        <p:spPr>
+          <a:xfrm>
+            <a:off x="1799966" y="1359243"/>
+            <a:ext cx="1194558" cy="369332"/>
+          </a:xfrm>
+          <a:prstGeom prst="rect">
+            <a:avLst/>
+          </a:prstGeom>
+          <a:noFill/>
+        </p:spPr>
+        <p:txBody>
+          <a:bodyPr wrap="none" rtlCol="0">
+            <a:spAutoFit/>
+          </a:bodyPr>
+          <a:lstStyle/>
+          <a:p>
+            <a:r>
+              <a:rPr lang="it-IT" dirty="0" smtClean="0"/>
+              <a:t>[immagini]</a:t>
+            </a:r>
+            <a:endParaRPr lang="it-IT" dirty="0"/>
+          </a:p>
+        </p:txBody>
+      </p:sp>
+      <p:sp>
+        <p:nvSpPr>
+          <p:cNvPr id="4" name="CasellaDiTesto 3"/>
+          <p:cNvSpPr txBox="1"/>
+          <p:nvPr/>
+        </p:nvSpPr>
+        <p:spPr>
+          <a:xfrm>
+            <a:off x="1799966" y="5350475"/>
+            <a:ext cx="4300665" cy="369332"/>
+          </a:xfrm>
+          <a:prstGeom prst="rect">
+            <a:avLst/>
+          </a:prstGeom>
+          <a:noFill/>
+        </p:spPr>
+        <p:txBody>
+          <a:bodyPr wrap="none" rtlCol="0">
+            <a:spAutoFit/>
+          </a:bodyPr>
+          <a:lstStyle/>
+          <a:p>
             <a:r>
               <a:rPr lang="it-IT" dirty="0" smtClean="0"/>
               <a:t>Vorremmo modellare meglio la percezione!</a:t>
             </a:r>
             <a:endParaRPr lang="it-IT" dirty="0"/>
+          </a:p>
+        </p:txBody>
+      </p:sp>
+      <p:sp>
+        <p:nvSpPr>
+          <p:cNvPr id="5" name="CasellaDiTesto 4"/>
+          <p:cNvSpPr txBox="1"/>
+          <p:nvPr/>
+        </p:nvSpPr>
+        <p:spPr>
+          <a:xfrm>
+            <a:off x="4621814" y="180000"/>
+            <a:ext cx="2948372" cy="523220"/>
+          </a:xfrm>
+          <a:prstGeom prst="rect">
+            <a:avLst/>
+          </a:prstGeom>
+          <a:noFill/>
+        </p:spPr>
+        <p:txBody>
+          <a:bodyPr wrap="none" rtlCol="0">
+            <a:spAutoFit/>
+          </a:bodyPr>
+          <a:lstStyle/>
+          <a:p>
+            <a:pPr algn="ctr"/>
+            <a:r>
+              <a:rPr lang="it-IT" sz="2800" dirty="0" smtClean="0"/>
+              <a:t>K-</a:t>
+            </a:r>
+            <a:r>
+              <a:rPr lang="it-IT" sz="2800" dirty="0" err="1" smtClean="0"/>
+              <a:t>means</a:t>
+            </a:r>
+            <a:r>
+              <a:rPr lang="it-IT" sz="2800" dirty="0" smtClean="0"/>
+              <a:t> </a:t>
+            </a:r>
+            <a:r>
+              <a:rPr lang="it-IT" sz="2800" dirty="0" err="1" smtClean="0"/>
+              <a:t>clustering</a:t>
+            </a:r>
+            <a:endParaRPr lang="it-IT" sz="2800" dirty="0"/>
           </a:p>
         </p:txBody>
       </p:sp>
@@ -3554,7 +5535,7 @@
 </p:sld>
 </file>
 
-<file path=ppt/slides/slide6.xml><?xml version="1.0" encoding="utf-8"?>
+<file path=ppt/slides/slide8.xml><?xml version="1.0" encoding="utf-8"?>
 <p:sld xmlns:a="http://schemas.openxmlformats.org/drawingml/2006/main" xmlns:r="http://schemas.openxmlformats.org/officeDocument/2006/relationships" xmlns:p="http://schemas.openxmlformats.org/presentationml/2006/main">
   <p:cSld>
     <p:spTree>
@@ -3746,567 +5727,6 @@
 </p:sld>
 </file>
 
-<file path=ppt/slides/slide7.xml><?xml version="1.0" encoding="utf-8"?>
-<p:sld xmlns:a="http://schemas.openxmlformats.org/drawingml/2006/main" xmlns:r="http://schemas.openxmlformats.org/officeDocument/2006/relationships" xmlns:p="http://schemas.openxmlformats.org/presentationml/2006/main">
-  <p:cSld>
-    <p:spTree>
-      <p:nvGrpSpPr>
-        <p:cNvPr id="1" name=""/>
-        <p:cNvGrpSpPr/>
-        <p:nvPr/>
-      </p:nvGrpSpPr>
-      <p:grpSpPr>
-        <a:xfrm>
-          <a:off x="0" y="0"/>
-          <a:ext cx="0" cy="0"/>
-          <a:chOff x="0" y="0"/>
-          <a:chExt cx="0" cy="0"/>
-        </a:xfrm>
-      </p:grpSpPr>
-      <p:sp>
-        <p:nvSpPr>
-          <p:cNvPr id="2" name="CasellaDiTesto 1"/>
-          <p:cNvSpPr txBox="1"/>
-          <p:nvPr/>
-        </p:nvSpPr>
-        <p:spPr>
-          <a:xfrm>
-            <a:off x="3855308" y="280086"/>
-            <a:ext cx="3864071" cy="523220"/>
-          </a:xfrm>
-          <a:prstGeom prst="rect">
-            <a:avLst/>
-          </a:prstGeom>
-          <a:noFill/>
-        </p:spPr>
-        <p:txBody>
-          <a:bodyPr wrap="none" rtlCol="0">
-            <a:spAutoFit/>
-          </a:bodyPr>
-          <a:lstStyle/>
-          <a:p>
-            <a:r>
-              <a:rPr lang="it-IT" sz="2800" dirty="0" err="1" smtClean="0"/>
-              <a:t>Reduced</a:t>
-            </a:r>
-            <a:r>
-              <a:rPr lang="it-IT" sz="2800" dirty="0" smtClean="0"/>
-              <a:t> </a:t>
-            </a:r>
-            <a:r>
-              <a:rPr lang="it-IT" sz="2800" dirty="0" err="1" smtClean="0"/>
-              <a:t>Delaunay</a:t>
-            </a:r>
-            <a:r>
-              <a:rPr lang="it-IT" sz="2800" dirty="0" smtClean="0"/>
-              <a:t> </a:t>
-            </a:r>
-            <a:r>
-              <a:rPr lang="it-IT" sz="2800" dirty="0" err="1" smtClean="0"/>
-              <a:t>Graph</a:t>
-            </a:r>
-            <a:endParaRPr lang="it-IT" sz="2800" dirty="0"/>
-          </a:p>
-        </p:txBody>
-      </p:sp>
-      <p:sp>
-        <p:nvSpPr>
-          <p:cNvPr id="3" name="CasellaDiTesto 2"/>
-          <p:cNvSpPr txBox="1"/>
-          <p:nvPr/>
-        </p:nvSpPr>
-        <p:spPr>
-          <a:xfrm>
-            <a:off x="716954" y="803306"/>
-            <a:ext cx="10140778" cy="369332"/>
-          </a:xfrm>
-          <a:prstGeom prst="rect">
-            <a:avLst/>
-          </a:prstGeom>
-          <a:noFill/>
-        </p:spPr>
-        <p:txBody>
-          <a:bodyPr wrap="square" rtlCol="0">
-            <a:spAutoFit/>
-          </a:bodyPr>
-          <a:lstStyle/>
-          <a:p>
-            <a:pPr algn="ctr"/>
-            <a:r>
-              <a:rPr lang="it-IT" dirty="0" smtClean="0"/>
-              <a:t>Tenere solo alcuni </a:t>
-            </a:r>
-            <a:r>
-              <a:rPr lang="it-IT" dirty="0" err="1" smtClean="0"/>
-              <a:t>edge</a:t>
-            </a:r>
-            <a:r>
-              <a:rPr lang="it-IT" dirty="0"/>
-              <a:t> </a:t>
-            </a:r>
-            <a:r>
-              <a:rPr lang="it-IT" dirty="0" smtClean="0"/>
-              <a:t>in modo da evidenziare le zone prossimali</a:t>
-            </a:r>
-            <a:endParaRPr lang="it-IT" dirty="0"/>
-          </a:p>
-        </p:txBody>
-      </p:sp>
-      <p:sp>
-        <p:nvSpPr>
-          <p:cNvPr id="4" name="CasellaDiTesto 3"/>
-          <p:cNvSpPr txBox="1"/>
-          <p:nvPr/>
-        </p:nvSpPr>
-        <p:spPr>
-          <a:xfrm>
-            <a:off x="1655805" y="3591697"/>
-            <a:ext cx="2425151" cy="369332"/>
-          </a:xfrm>
-          <a:prstGeom prst="rect">
-            <a:avLst/>
-          </a:prstGeom>
-          <a:noFill/>
-        </p:spPr>
-        <p:txBody>
-          <a:bodyPr wrap="none" rtlCol="0">
-            <a:spAutoFit/>
-          </a:bodyPr>
-          <a:lstStyle/>
-          <a:p>
-            <a:r>
-              <a:rPr lang="it-IT" dirty="0" smtClean="0"/>
-              <a:t>[grafo </a:t>
-            </a:r>
-            <a:r>
-              <a:rPr lang="it-IT" dirty="0" err="1" smtClean="0"/>
-              <a:t>delaunay</a:t>
-            </a:r>
-            <a:r>
-              <a:rPr lang="it-IT" dirty="0" smtClean="0"/>
-              <a:t> faccina]</a:t>
-            </a:r>
-            <a:endParaRPr lang="it-IT" dirty="0"/>
-          </a:p>
-        </p:txBody>
-      </p:sp>
-      <p:sp>
-        <p:nvSpPr>
-          <p:cNvPr id="5" name="CasellaDiTesto 4"/>
-          <p:cNvSpPr txBox="1"/>
-          <p:nvPr/>
-        </p:nvSpPr>
-        <p:spPr>
-          <a:xfrm>
-            <a:off x="7212227" y="3591697"/>
-            <a:ext cx="3249287" cy="369332"/>
-          </a:xfrm>
-          <a:prstGeom prst="rect">
-            <a:avLst/>
-          </a:prstGeom>
-          <a:noFill/>
-        </p:spPr>
-        <p:txBody>
-          <a:bodyPr wrap="none" rtlCol="0">
-            <a:spAutoFit/>
-          </a:bodyPr>
-          <a:lstStyle/>
-          <a:p>
-            <a:r>
-              <a:rPr lang="it-IT" dirty="0" smtClean="0"/>
-              <a:t>[</a:t>
-            </a:r>
-            <a:r>
-              <a:rPr lang="it-IT" dirty="0" err="1" smtClean="0"/>
-              <a:t>reduced</a:t>
-            </a:r>
-            <a:r>
-              <a:rPr lang="it-IT" dirty="0" smtClean="0"/>
-              <a:t> grafo </a:t>
-            </a:r>
-            <a:r>
-              <a:rPr lang="it-IT" dirty="0" err="1" smtClean="0"/>
-              <a:t>delaunay</a:t>
-            </a:r>
-            <a:r>
-              <a:rPr lang="it-IT" dirty="0" smtClean="0"/>
-              <a:t> faccina]</a:t>
-            </a:r>
-            <a:endParaRPr lang="it-IT" dirty="0"/>
-          </a:p>
-        </p:txBody>
-      </p:sp>
-    </p:spTree>
-    <p:extLst>
-      <p:ext uri="{BB962C8B-B14F-4D97-AF65-F5344CB8AC3E}">
-        <p14:creationId xmlns:p14="http://schemas.microsoft.com/office/powerpoint/2010/main" val="3778479829"/>
-      </p:ext>
-    </p:extLst>
-  </p:cSld>
-  <p:clrMapOvr>
-    <a:masterClrMapping/>
-  </p:clrMapOvr>
-</p:sld>
-</file>
-
-<file path=ppt/slides/slide8.xml><?xml version="1.0" encoding="utf-8"?>
-<p:sld xmlns:a="http://schemas.openxmlformats.org/drawingml/2006/main" xmlns:r="http://schemas.openxmlformats.org/officeDocument/2006/relationships" xmlns:p="http://schemas.openxmlformats.org/presentationml/2006/main">
-  <p:cSld>
-    <p:bg>
-      <p:bgPr>
-        <a:blipFill dpi="0" rotWithShape="1">
-          <a:blip r:embed="rId2">
-            <a:lum/>
-          </a:blip>
-          <a:srcRect/>
-          <a:stretch>
-            <a:fillRect/>
-          </a:stretch>
-        </a:blipFill>
-        <a:effectLst/>
-      </p:bgPr>
-    </p:bg>
-    <p:spTree>
-      <p:nvGrpSpPr>
-        <p:cNvPr id="1" name=""/>
-        <p:cNvGrpSpPr/>
-        <p:nvPr/>
-      </p:nvGrpSpPr>
-      <p:grpSpPr>
-        <a:xfrm>
-          <a:off x="0" y="0"/>
-          <a:ext cx="0" cy="0"/>
-          <a:chOff x="0" y="0"/>
-          <a:chExt cx="0" cy="0"/>
-        </a:xfrm>
-      </p:grpSpPr>
-      <p:sp>
-        <p:nvSpPr>
-          <p:cNvPr id="2" name="CasellaDiTesto 1"/>
-          <p:cNvSpPr txBox="1"/>
-          <p:nvPr/>
-        </p:nvSpPr>
-        <p:spPr>
-          <a:xfrm>
-            <a:off x="708454" y="354226"/>
-            <a:ext cx="1632948" cy="523220"/>
-          </a:xfrm>
-          <a:prstGeom prst="rect">
-            <a:avLst/>
-          </a:prstGeom>
-          <a:noFill/>
-        </p:spPr>
-        <p:txBody>
-          <a:bodyPr wrap="none" rtlCol="0">
-            <a:spAutoFit/>
-          </a:bodyPr>
-          <a:lstStyle/>
-          <a:p>
-            <a:r>
-              <a:rPr lang="it-IT" sz="2800" dirty="0" smtClean="0"/>
-              <a:t>Algoritmo</a:t>
-            </a:r>
-            <a:endParaRPr lang="it-IT" sz="2800" dirty="0"/>
-          </a:p>
-        </p:txBody>
-      </p:sp>
-      <p:sp>
-        <p:nvSpPr>
-          <p:cNvPr id="3" name="CasellaDiTesto 2"/>
-          <p:cNvSpPr txBox="1"/>
-          <p:nvPr/>
-        </p:nvSpPr>
-        <p:spPr>
-          <a:xfrm>
-            <a:off x="708455" y="2640344"/>
-            <a:ext cx="10140778" cy="369332"/>
-          </a:xfrm>
-          <a:prstGeom prst="rect">
-            <a:avLst/>
-          </a:prstGeom>
-          <a:noFill/>
-        </p:spPr>
-        <p:txBody>
-          <a:bodyPr wrap="square" rtlCol="0">
-            <a:spAutoFit/>
-          </a:bodyPr>
-          <a:lstStyle/>
-          <a:p>
-            <a:r>
-              <a:rPr lang="it-IT" dirty="0" smtClean="0"/>
-              <a:t>1. Calcolo la </a:t>
-            </a:r>
-            <a:r>
-              <a:rPr lang="it-IT" b="1" dirty="0" smtClean="0"/>
-              <a:t>triangolazione di </a:t>
-            </a:r>
-            <a:r>
-              <a:rPr lang="it-IT" b="1" dirty="0" err="1" smtClean="0"/>
-              <a:t>Delaunay</a:t>
-            </a:r>
-            <a:r>
-              <a:rPr lang="it-IT" dirty="0"/>
-              <a:t> </a:t>
-            </a:r>
-            <a:r>
-              <a:rPr lang="it-IT" dirty="0" smtClean="0"/>
-              <a:t>sui punti dati in input</a:t>
-            </a:r>
-            <a:endParaRPr lang="it-IT" b="1" dirty="0"/>
-          </a:p>
-        </p:txBody>
-      </p:sp>
-      <p:sp>
-        <p:nvSpPr>
-          <p:cNvPr id="4" name="CasellaDiTesto 3"/>
-          <p:cNvSpPr txBox="1"/>
-          <p:nvPr/>
-        </p:nvSpPr>
-        <p:spPr>
-          <a:xfrm>
-            <a:off x="708455" y="3009676"/>
-            <a:ext cx="10140778" cy="369332"/>
-          </a:xfrm>
-          <a:prstGeom prst="rect">
-            <a:avLst/>
-          </a:prstGeom>
-          <a:noFill/>
-        </p:spPr>
-        <p:txBody>
-          <a:bodyPr wrap="square" rtlCol="0">
-            <a:spAutoFit/>
-          </a:bodyPr>
-          <a:lstStyle/>
-          <a:p>
-            <a:r>
-              <a:rPr lang="it-IT" dirty="0" smtClean="0"/>
-              <a:t>2. Calcolo le </a:t>
-            </a:r>
-            <a:r>
-              <a:rPr lang="it-IT" b="1" dirty="0" smtClean="0"/>
-              <a:t>distanze</a:t>
-            </a:r>
-            <a:r>
-              <a:rPr lang="it-IT" dirty="0" smtClean="0"/>
-              <a:t> tra i vicini</a:t>
-            </a:r>
-            <a:endParaRPr lang="it-IT" dirty="0"/>
-          </a:p>
-        </p:txBody>
-      </p:sp>
-      <p:sp>
-        <p:nvSpPr>
-          <p:cNvPr id="5" name="CasellaDiTesto 4"/>
-          <p:cNvSpPr txBox="1"/>
-          <p:nvPr/>
-        </p:nvSpPr>
-        <p:spPr>
-          <a:xfrm>
-            <a:off x="708455" y="3379008"/>
-            <a:ext cx="10140778" cy="369332"/>
-          </a:xfrm>
-          <a:prstGeom prst="rect">
-            <a:avLst/>
-          </a:prstGeom>
-          <a:noFill/>
-        </p:spPr>
-        <p:txBody>
-          <a:bodyPr wrap="square" rtlCol="0">
-            <a:spAutoFit/>
-          </a:bodyPr>
-          <a:lstStyle/>
-          <a:p>
-            <a:r>
-              <a:rPr lang="it-IT" dirty="0" smtClean="0"/>
-              <a:t>3. </a:t>
-            </a:r>
-            <a:r>
-              <a:rPr lang="it-IT" b="1" dirty="0" smtClean="0"/>
-              <a:t>Normalizzo</a:t>
-            </a:r>
-            <a:r>
-              <a:rPr lang="it-IT" dirty="0" smtClean="0"/>
-              <a:t> distanze con il minimo delle distanze tra i vicini</a:t>
-            </a:r>
-          </a:p>
-        </p:txBody>
-      </p:sp>
-      <p:sp>
-        <p:nvSpPr>
-          <p:cNvPr id="6" name="CasellaDiTesto 5"/>
-          <p:cNvSpPr txBox="1"/>
-          <p:nvPr/>
-        </p:nvSpPr>
-        <p:spPr>
-          <a:xfrm>
-            <a:off x="708454" y="3748340"/>
-            <a:ext cx="10552671" cy="369332"/>
-          </a:xfrm>
-          <a:prstGeom prst="rect">
-            <a:avLst/>
-          </a:prstGeom>
-          <a:noFill/>
-        </p:spPr>
-        <p:txBody>
-          <a:bodyPr wrap="square" rtlCol="0">
-            <a:spAutoFit/>
-          </a:bodyPr>
-          <a:lstStyle/>
-          <a:p>
-            <a:r>
-              <a:rPr lang="it-IT" dirty="0"/>
-              <a:t>4</a:t>
-            </a:r>
-            <a:r>
-              <a:rPr lang="it-IT" dirty="0" smtClean="0"/>
-              <a:t>. Calcolo la </a:t>
-            </a:r>
-            <a:r>
-              <a:rPr lang="it-IT" b="1" dirty="0" smtClean="0"/>
-              <a:t>media geometrica </a:t>
-            </a:r>
-            <a:r>
-              <a:rPr lang="it-IT" dirty="0" smtClean="0"/>
-              <a:t>tra i due rapporti che ho trovato per ogni </a:t>
-            </a:r>
-            <a:r>
-              <a:rPr lang="it-IT" dirty="0" err="1" smtClean="0"/>
-              <a:t>edge</a:t>
-            </a:r>
-            <a:r>
-              <a:rPr lang="it-IT" dirty="0" smtClean="0"/>
-              <a:t> e associo il risultato ad ogni </a:t>
-            </a:r>
-            <a:r>
-              <a:rPr lang="it-IT" dirty="0" err="1" smtClean="0"/>
-              <a:t>edge</a:t>
-            </a:r>
-            <a:endParaRPr lang="it-IT" dirty="0" smtClean="0"/>
-          </a:p>
-        </p:txBody>
-      </p:sp>
-      <p:sp>
-        <p:nvSpPr>
-          <p:cNvPr id="7" name="CasellaDiTesto 6"/>
-          <p:cNvSpPr txBox="1"/>
-          <p:nvPr/>
-        </p:nvSpPr>
-        <p:spPr>
-          <a:xfrm>
-            <a:off x="708455" y="4117672"/>
-            <a:ext cx="10140778" cy="369332"/>
-          </a:xfrm>
-          <a:prstGeom prst="rect">
-            <a:avLst/>
-          </a:prstGeom>
-          <a:noFill/>
-        </p:spPr>
-        <p:txBody>
-          <a:bodyPr wrap="square" rtlCol="0">
-            <a:spAutoFit/>
-          </a:bodyPr>
-          <a:lstStyle/>
-          <a:p>
-            <a:r>
-              <a:rPr lang="it-IT" dirty="0" smtClean="0"/>
-              <a:t>5. </a:t>
-            </a:r>
-            <a:r>
-              <a:rPr lang="it-IT" b="1" dirty="0" err="1" smtClean="0"/>
-              <a:t>Thresholding</a:t>
-            </a:r>
-            <a:r>
-              <a:rPr lang="it-IT" dirty="0" smtClean="0"/>
-              <a:t>: elimino gli </a:t>
-            </a:r>
-            <a:r>
-              <a:rPr lang="it-IT" dirty="0" err="1" smtClean="0"/>
-              <a:t>edge</a:t>
-            </a:r>
-            <a:r>
-              <a:rPr lang="it-IT" dirty="0" smtClean="0"/>
-              <a:t> il cui numero assegnato al punto 4. è maggiore di un certo </a:t>
-            </a:r>
-            <a:r>
-              <a:rPr lang="it-IT" dirty="0" err="1" smtClean="0"/>
-              <a:t>threshold</a:t>
-            </a:r>
-            <a:endParaRPr lang="it-IT" dirty="0" smtClean="0"/>
-          </a:p>
-        </p:txBody>
-      </p:sp>
-      <p:sp>
-        <p:nvSpPr>
-          <p:cNvPr id="9" name="CasellaDiTesto 8"/>
-          <p:cNvSpPr txBox="1"/>
-          <p:nvPr/>
-        </p:nvSpPr>
-        <p:spPr>
-          <a:xfrm>
-            <a:off x="708454" y="1435729"/>
-            <a:ext cx="10140778" cy="646331"/>
-          </a:xfrm>
-          <a:prstGeom prst="rect">
-            <a:avLst/>
-          </a:prstGeom>
-          <a:noFill/>
-        </p:spPr>
-        <p:txBody>
-          <a:bodyPr wrap="square" rtlCol="0">
-            <a:spAutoFit/>
-          </a:bodyPr>
-          <a:lstStyle/>
-          <a:p>
-            <a:r>
-              <a:rPr lang="it-IT" b="1" dirty="0" smtClean="0"/>
-              <a:t>Input</a:t>
-            </a:r>
-            <a:r>
-              <a:rPr lang="it-IT" dirty="0" smtClean="0"/>
-              <a:t>: un array di punti nel piano caratterizzati da una coppia di coordinate [</a:t>
-            </a:r>
-            <a:r>
-              <a:rPr lang="it-IT" dirty="0" err="1" smtClean="0"/>
-              <a:t>x,y</a:t>
-            </a:r>
-            <a:r>
-              <a:rPr lang="it-IT" dirty="0" smtClean="0"/>
-              <a:t>]</a:t>
-            </a:r>
-          </a:p>
-          <a:p>
-            <a:r>
-              <a:rPr lang="it-IT" b="1" dirty="0" smtClean="0"/>
-              <a:t>Output</a:t>
-            </a:r>
-            <a:r>
-              <a:rPr lang="it-IT" dirty="0" smtClean="0"/>
-              <a:t>: un array di punti ridotto che, collegati con </a:t>
-            </a:r>
-            <a:r>
-              <a:rPr lang="it-IT" dirty="0" err="1" smtClean="0"/>
-              <a:t>edge</a:t>
-            </a:r>
-            <a:r>
-              <a:rPr lang="it-IT" dirty="0" smtClean="0"/>
-              <a:t>, formano l’RDG</a:t>
-            </a:r>
-          </a:p>
-        </p:txBody>
-      </p:sp>
-    </p:spTree>
-    <p:extLst>
-      <p:ext uri="{BB962C8B-B14F-4D97-AF65-F5344CB8AC3E}">
-        <p14:creationId xmlns:p14="http://schemas.microsoft.com/office/powerpoint/2010/main" val="1733597500"/>
-      </p:ext>
-    </p:extLst>
-  </p:cSld>
-  <p:clrMapOvr>
-    <a:masterClrMapping/>
-  </p:clrMapOvr>
-</p:sld>
-</file>
-
 <file path=ppt/slides/slide9.xml><?xml version="1.0" encoding="utf-8"?>
 <p:sld xmlns:a="http://schemas.openxmlformats.org/drawingml/2006/main" xmlns:r="http://schemas.openxmlformats.org/officeDocument/2006/relationships" xmlns:p="http://schemas.openxmlformats.org/presentationml/2006/main">
   <p:cSld>
@@ -4326,14 +5746,14 @@
       </p:grpSpPr>
       <p:sp>
         <p:nvSpPr>
-          <p:cNvPr id="3" name="CasellaDiTesto 2"/>
+          <p:cNvPr id="2" name="CasellaDiTesto 1"/>
           <p:cNvSpPr txBox="1"/>
           <p:nvPr/>
         </p:nvSpPr>
         <p:spPr>
           <a:xfrm>
-            <a:off x="4291914" y="197708"/>
-            <a:ext cx="2555508" cy="523220"/>
+            <a:off x="4163964" y="180000"/>
+            <a:ext cx="3864071" cy="523220"/>
           </a:xfrm>
           <a:prstGeom prst="rect">
             <a:avLst/>
@@ -4346,17 +5766,26 @@
           </a:bodyPr>
           <a:lstStyle/>
           <a:p>
+            <a:pPr algn="ctr"/>
+            <a:r>
+              <a:rPr lang="it-IT" sz="2800" dirty="0" err="1" smtClean="0"/>
+              <a:t>Reduced</a:t>
+            </a:r>
             <a:r>
               <a:rPr lang="it-IT" sz="2800" dirty="0" smtClean="0"/>
-              <a:t>K-</a:t>
+              <a:t> </a:t>
             </a:r>
             <a:r>
               <a:rPr lang="it-IT" sz="2800" dirty="0" err="1" smtClean="0"/>
-              <a:t>means</a:t>
+              <a:t>Delaunay</a:t>
             </a:r>
             <a:r>
               <a:rPr lang="it-IT" sz="2800" dirty="0" smtClean="0"/>
-              <a:t> vs RDG</a:t>
+              <a:t> </a:t>
+            </a:r>
+            <a:r>
+              <a:rPr lang="it-IT" sz="2800" dirty="0" err="1" smtClean="0"/>
+              <a:t>Graph</a:t>
             </a:r>
             <a:endParaRPr lang="it-IT" sz="2800" dirty="0"/>
           </a:p>
@@ -4364,14 +5793,14 @@
       </p:sp>
       <p:sp>
         <p:nvSpPr>
-          <p:cNvPr id="4" name="CasellaDiTesto 3"/>
+          <p:cNvPr id="3" name="CasellaDiTesto 2"/>
           <p:cNvSpPr txBox="1"/>
           <p:nvPr/>
         </p:nvSpPr>
         <p:spPr>
           <a:xfrm>
-            <a:off x="1186249" y="1375719"/>
-            <a:ext cx="8147743" cy="369332"/>
+            <a:off x="1025610" y="761547"/>
+            <a:ext cx="10140778" cy="369332"/>
           </a:xfrm>
           <a:prstGeom prst="rect">
             <a:avLst/>
@@ -4379,6 +5808,49 @@
           <a:noFill/>
         </p:spPr>
         <p:txBody>
+          <a:bodyPr wrap="square" rtlCol="0">
+            <a:spAutoFit/>
+          </a:bodyPr>
+          <a:lstStyle/>
+          <a:p>
+            <a:pPr algn="ctr"/>
+            <a:r>
+              <a:rPr lang="it-IT" dirty="0" smtClean="0"/>
+              <a:t>Tenere solo alcuni </a:t>
+            </a:r>
+            <a:r>
+              <a:rPr lang="it-IT" dirty="0" err="1" smtClean="0"/>
+              <a:t>edge</a:t>
+            </a:r>
+            <a:r>
+              <a:rPr lang="it-IT" dirty="0"/>
+              <a:t> </a:t>
+            </a:r>
+            <a:r>
+              <a:rPr lang="it-IT" dirty="0" smtClean="0"/>
+              <a:t>in modo da evidenziare le zone prossimali</a:t>
+            </a:r>
+            <a:endParaRPr lang="it-IT" dirty="0"/>
+          </a:p>
+        </p:txBody>
+      </p:sp>
+      <p:sp>
+        <p:nvSpPr>
+          <p:cNvPr id="4" name="CasellaDiTesto 3"/>
+          <p:cNvSpPr txBox="1"/>
+          <p:nvPr/>
+        </p:nvSpPr>
+        <p:spPr>
+          <a:xfrm>
+            <a:off x="1655805" y="3591697"/>
+            <a:ext cx="2425151" cy="369332"/>
+          </a:xfrm>
+          <a:prstGeom prst="rect">
+            <a:avLst/>
+          </a:prstGeom>
+          <a:noFill/>
+        </p:spPr>
+        <p:txBody>
           <a:bodyPr wrap="none" rtlCol="0">
             <a:spAutoFit/>
           </a:bodyPr>
@@ -4386,7 +5858,61 @@
           <a:p>
             <a:r>
               <a:rPr lang="it-IT" dirty="0" smtClean="0"/>
-              <a:t>[mettere immagini e magari complessità computazionale e tempi di esecuzione medi]</a:t>
+              <a:t>[grafo </a:t>
+            </a:r>
+            <a:r>
+              <a:rPr lang="it-IT" dirty="0" err="1" smtClean="0"/>
+              <a:t>delaunay</a:t>
+            </a:r>
+            <a:r>
+              <a:rPr lang="it-IT" dirty="0" smtClean="0"/>
+              <a:t> faccina]</a:t>
+            </a:r>
+            <a:endParaRPr lang="it-IT" dirty="0"/>
+          </a:p>
+        </p:txBody>
+      </p:sp>
+      <p:sp>
+        <p:nvSpPr>
+          <p:cNvPr id="5" name="CasellaDiTesto 4"/>
+          <p:cNvSpPr txBox="1"/>
+          <p:nvPr/>
+        </p:nvSpPr>
+        <p:spPr>
+          <a:xfrm>
+            <a:off x="7212227" y="3591697"/>
+            <a:ext cx="3249287" cy="369332"/>
+          </a:xfrm>
+          <a:prstGeom prst="rect">
+            <a:avLst/>
+          </a:prstGeom>
+          <a:noFill/>
+        </p:spPr>
+        <p:txBody>
+          <a:bodyPr wrap="none" rtlCol="0">
+            <a:spAutoFit/>
+          </a:bodyPr>
+          <a:lstStyle/>
+          <a:p>
+            <a:r>
+              <a:rPr lang="it-IT" dirty="0" smtClean="0"/>
+              <a:t>[</a:t>
+            </a:r>
+            <a:r>
+              <a:rPr lang="it-IT" dirty="0" err="1" smtClean="0"/>
+              <a:t>reduced</a:t>
+            </a:r>
+            <a:r>
+              <a:rPr lang="it-IT" dirty="0" smtClean="0"/>
+              <a:t> grafo </a:t>
+            </a:r>
+            <a:r>
+              <a:rPr lang="it-IT" dirty="0" err="1" smtClean="0"/>
+              <a:t>delaunay</a:t>
+            </a:r>
+            <a:r>
+              <a:rPr lang="it-IT" dirty="0" smtClean="0"/>
+              <a:t> faccina]</a:t>
             </a:r>
             <a:endParaRPr lang="it-IT" dirty="0"/>
           </a:p>
@@ -4395,13 +5921,20 @@
     </p:spTree>
     <p:extLst>
       <p:ext uri="{BB962C8B-B14F-4D97-AF65-F5344CB8AC3E}">
-        <p14:creationId xmlns:p14="http://schemas.microsoft.com/office/powerpoint/2010/main" val="3829976881"/>
+        <p14:creationId xmlns:p14="http://schemas.microsoft.com/office/powerpoint/2010/main" val="3778479829"/>
       </p:ext>
     </p:extLst>
   </p:cSld>
   <p:clrMapOvr>
     <a:masterClrMapping/>
   </p:clrMapOvr>
+  <p:timing>
+    <p:tnLst>
+      <p:par>
+        <p:cTn id="1" dur="indefinite" restart="never" nodeType="tmRoot"/>
+      </p:par>
+    </p:tnLst>
+  </p:timing>
 </p:sld>
 </file>
 

</xml_diff>

<commit_message>
Updated presentation and attempted fixing rdg
</commit_message>
<xml_diff>
--- a/presentation.pptx
+++ b/presentation.pptx
@@ -267,7 +267,7 @@
           <a:p>
             <a:fld id="{FEAFAA5B-A067-44C5-BC05-80171B363320}" type="datetimeFigureOut">
               <a:rPr lang="it-IT" smtClean="0"/>
-              <a:t>11/11/2023</a:t>
+              <a:t>12/11/2023</a:t>
             </a:fld>
             <a:endParaRPr lang="it-IT"/>
           </a:p>
@@ -437,7 +437,7 @@
           <a:p>
             <a:fld id="{FEAFAA5B-A067-44C5-BC05-80171B363320}" type="datetimeFigureOut">
               <a:rPr lang="it-IT" smtClean="0"/>
-              <a:t>11/11/2023</a:t>
+              <a:t>12/11/2023</a:t>
             </a:fld>
             <a:endParaRPr lang="it-IT"/>
           </a:p>
@@ -617,7 +617,7 @@
           <a:p>
             <a:fld id="{FEAFAA5B-A067-44C5-BC05-80171B363320}" type="datetimeFigureOut">
               <a:rPr lang="it-IT" smtClean="0"/>
-              <a:t>11/11/2023</a:t>
+              <a:t>12/11/2023</a:t>
             </a:fld>
             <a:endParaRPr lang="it-IT"/>
           </a:p>
@@ -787,7 +787,7 @@
           <a:p>
             <a:fld id="{FEAFAA5B-A067-44C5-BC05-80171B363320}" type="datetimeFigureOut">
               <a:rPr lang="it-IT" smtClean="0"/>
-              <a:t>11/11/2023</a:t>
+              <a:t>12/11/2023</a:t>
             </a:fld>
             <a:endParaRPr lang="it-IT"/>
           </a:p>
@@ -1033,7 +1033,7 @@
           <a:p>
             <a:fld id="{FEAFAA5B-A067-44C5-BC05-80171B363320}" type="datetimeFigureOut">
               <a:rPr lang="it-IT" smtClean="0"/>
-              <a:t>11/11/2023</a:t>
+              <a:t>12/11/2023</a:t>
             </a:fld>
             <a:endParaRPr lang="it-IT"/>
           </a:p>
@@ -1265,7 +1265,7 @@
           <a:p>
             <a:fld id="{FEAFAA5B-A067-44C5-BC05-80171B363320}" type="datetimeFigureOut">
               <a:rPr lang="it-IT" smtClean="0"/>
-              <a:t>11/11/2023</a:t>
+              <a:t>12/11/2023</a:t>
             </a:fld>
             <a:endParaRPr lang="it-IT"/>
           </a:p>
@@ -1632,7 +1632,7 @@
           <a:p>
             <a:fld id="{FEAFAA5B-A067-44C5-BC05-80171B363320}" type="datetimeFigureOut">
               <a:rPr lang="it-IT" smtClean="0"/>
-              <a:t>11/11/2023</a:t>
+              <a:t>12/11/2023</a:t>
             </a:fld>
             <a:endParaRPr lang="it-IT"/>
           </a:p>
@@ -1750,7 +1750,7 @@
           <a:p>
             <a:fld id="{FEAFAA5B-A067-44C5-BC05-80171B363320}" type="datetimeFigureOut">
               <a:rPr lang="it-IT" smtClean="0"/>
-              <a:t>11/11/2023</a:t>
+              <a:t>12/11/2023</a:t>
             </a:fld>
             <a:endParaRPr lang="it-IT"/>
           </a:p>
@@ -1845,7 +1845,7 @@
           <a:p>
             <a:fld id="{FEAFAA5B-A067-44C5-BC05-80171B363320}" type="datetimeFigureOut">
               <a:rPr lang="it-IT" smtClean="0"/>
-              <a:t>11/11/2023</a:t>
+              <a:t>12/11/2023</a:t>
             </a:fld>
             <a:endParaRPr lang="it-IT"/>
           </a:p>
@@ -2122,7 +2122,7 @@
           <a:p>
             <a:fld id="{FEAFAA5B-A067-44C5-BC05-80171B363320}" type="datetimeFigureOut">
               <a:rPr lang="it-IT" smtClean="0"/>
-              <a:t>11/11/2023</a:t>
+              <a:t>12/11/2023</a:t>
             </a:fld>
             <a:endParaRPr lang="it-IT"/>
           </a:p>
@@ -2375,7 +2375,7 @@
           <a:p>
             <a:fld id="{FEAFAA5B-A067-44C5-BC05-80171B363320}" type="datetimeFigureOut">
               <a:rPr lang="it-IT" smtClean="0"/>
-              <a:t>11/11/2023</a:t>
+              <a:t>12/11/2023</a:t>
             </a:fld>
             <a:endParaRPr lang="it-IT"/>
           </a:p>
@@ -2597,7 +2597,7 @@
           <a:p>
             <a:fld id="{FEAFAA5B-A067-44C5-BC05-80171B363320}" type="datetimeFigureOut">
               <a:rPr lang="it-IT" smtClean="0"/>
-              <a:t>11/11/2023</a:t>
+              <a:t>12/11/2023</a:t>
             </a:fld>
             <a:endParaRPr lang="it-IT"/>
           </a:p>
@@ -3166,15 +3166,7 @@
           <a:p>
             <a:r>
               <a:rPr lang="it-IT" dirty="0" smtClean="0"/>
-              <a:t>1. </a:t>
-            </a:r>
-            <a:r>
-              <a:rPr lang="it-IT" dirty="0" smtClean="0"/>
-              <a:t>Calcolare </a:t>
-            </a:r>
-            <a:r>
-              <a:rPr lang="it-IT" dirty="0" smtClean="0"/>
-              <a:t>la </a:t>
+              <a:t>1. Calcolare la </a:t>
             </a:r>
             <a:r>
               <a:rPr lang="it-IT" b="1" dirty="0" smtClean="0"/>
@@ -3220,15 +3212,7 @@
           <a:p>
             <a:r>
               <a:rPr lang="it-IT" dirty="0" smtClean="0"/>
-              <a:t>2. </a:t>
-            </a:r>
-            <a:r>
-              <a:rPr lang="it-IT" dirty="0" smtClean="0"/>
-              <a:t>Calcolare </a:t>
-            </a:r>
-            <a:r>
-              <a:rPr lang="it-IT" dirty="0" smtClean="0"/>
-              <a:t>le </a:t>
+              <a:t>2. Calcolare le </a:t>
             </a:r>
             <a:r>
               <a:rPr lang="it-IT" b="1" dirty="0" smtClean="0"/>
@@ -3274,11 +3258,7 @@
             </a:r>
             <a:r>
               <a:rPr lang="it-IT" dirty="0" smtClean="0"/>
-              <a:t> </a:t>
-            </a:r>
-            <a:r>
-              <a:rPr lang="it-IT" dirty="0" smtClean="0"/>
-              <a:t>distanze con il minimo delle distanze tra i vicini</a:t>
+              <a:t> distanze con il minimo delle distanze tra i vicini</a:t>
             </a:r>
           </a:p>
         </p:txBody>
@@ -3311,15 +3291,7 @@
             </a:r>
             <a:r>
               <a:rPr lang="it-IT" dirty="0" smtClean="0"/>
-              <a:t>. </a:t>
-            </a:r>
-            <a:r>
-              <a:rPr lang="it-IT" dirty="0" smtClean="0"/>
-              <a:t>Calcolare </a:t>
-            </a:r>
-            <a:r>
-              <a:rPr lang="it-IT" dirty="0" smtClean="0"/>
-              <a:t>la </a:t>
+              <a:t>. Calcolare la </a:t>
             </a:r>
             <a:r>
               <a:rPr lang="it-IT" b="1" dirty="0" smtClean="0"/>
@@ -3377,15 +3349,7 @@
             </a:r>
             <a:r>
               <a:rPr lang="it-IT" dirty="0" smtClean="0"/>
-              <a:t>: </a:t>
-            </a:r>
-            <a:r>
-              <a:rPr lang="it-IT" dirty="0" smtClean="0"/>
-              <a:t>eliminare </a:t>
-            </a:r>
-            <a:r>
-              <a:rPr lang="it-IT" dirty="0" smtClean="0"/>
-              <a:t>gli </a:t>
+              <a:t>: eliminare gli </a:t>
             </a:r>
             <a:r>
               <a:rPr lang="it-IT" dirty="0" err="1" smtClean="0"/>
@@ -3441,7 +3405,6 @@
               <a:rPr lang="it-IT" dirty="0" smtClean="0"/>
               <a:t>].</a:t>
             </a:r>
-            <a:endParaRPr lang="it-IT" dirty="0" smtClean="0"/>
           </a:p>
           <a:p>
             <a:r>
@@ -3458,13 +3421,8 @@
             </a:r>
             <a:r>
               <a:rPr lang="it-IT" dirty="0" smtClean="0"/>
-              <a:t>, formano </a:t>
-            </a:r>
-            <a:r>
-              <a:rPr lang="it-IT" dirty="0" smtClean="0"/>
-              <a:t>l’RDG.</a:t>
-            </a:r>
-            <a:endParaRPr lang="it-IT" dirty="0" smtClean="0"/>
+              <a:t>, formano l’RDG.</a:t>
+            </a:r>
           </a:p>
         </p:txBody>
       </p:sp>
@@ -4769,7 +4727,11 @@
             </a:r>
             <a:r>
               <a:rPr lang="it-IT" dirty="0" smtClean="0"/>
-              <a:t> è quell’insieme di tecniche volte </a:t>
+              <a:t> è quell’insieme di tecniche </a:t>
+            </a:r>
+            <a:r>
+              <a:rPr lang="it-IT" dirty="0" smtClean="0"/>
+              <a:t>non supervisionate volte </a:t>
             </a:r>
             <a:r>
               <a:rPr lang="it-IT" dirty="0"/>
@@ -5828,7 +5790,11 @@
             </a:r>
             <a:r>
               <a:rPr lang="it-IT" dirty="0" smtClean="0"/>
-              <a:t>in modo da evidenziare le zone prossimali</a:t>
+              <a:t>in modo da evidenziare le zone </a:t>
+            </a:r>
+            <a:r>
+              <a:rPr lang="it-IT" dirty="0" smtClean="0"/>
+              <a:t>prossimali.</a:t>
             </a:r>
             <a:endParaRPr lang="it-IT" dirty="0"/>
           </a:p>

</xml_diff>

<commit_message>
Updated notebook with comments and spiral pattern
</commit_message>
<xml_diff>
--- a/presentation.pptx
+++ b/presentation.pptx
@@ -269,7 +269,7 @@
           <a:p>
             <a:fld id="{FEAFAA5B-A067-44C5-BC05-80171B363320}" type="datetimeFigureOut">
               <a:rPr lang="it-IT" smtClean="0"/>
-              <a:t>14/11/2023</a:t>
+              <a:t>15/11/2023</a:t>
             </a:fld>
             <a:endParaRPr lang="it-IT"/>
           </a:p>
@@ -439,7 +439,7 @@
           <a:p>
             <a:fld id="{FEAFAA5B-A067-44C5-BC05-80171B363320}" type="datetimeFigureOut">
               <a:rPr lang="it-IT" smtClean="0"/>
-              <a:t>14/11/2023</a:t>
+              <a:t>15/11/2023</a:t>
             </a:fld>
             <a:endParaRPr lang="it-IT"/>
           </a:p>
@@ -619,7 +619,7 @@
           <a:p>
             <a:fld id="{FEAFAA5B-A067-44C5-BC05-80171B363320}" type="datetimeFigureOut">
               <a:rPr lang="it-IT" smtClean="0"/>
-              <a:t>14/11/2023</a:t>
+              <a:t>15/11/2023</a:t>
             </a:fld>
             <a:endParaRPr lang="it-IT"/>
           </a:p>
@@ -789,7 +789,7 @@
           <a:p>
             <a:fld id="{FEAFAA5B-A067-44C5-BC05-80171B363320}" type="datetimeFigureOut">
               <a:rPr lang="it-IT" smtClean="0"/>
-              <a:t>14/11/2023</a:t>
+              <a:t>15/11/2023</a:t>
             </a:fld>
             <a:endParaRPr lang="it-IT"/>
           </a:p>
@@ -1035,7 +1035,7 @@
           <a:p>
             <a:fld id="{FEAFAA5B-A067-44C5-BC05-80171B363320}" type="datetimeFigureOut">
               <a:rPr lang="it-IT" smtClean="0"/>
-              <a:t>14/11/2023</a:t>
+              <a:t>15/11/2023</a:t>
             </a:fld>
             <a:endParaRPr lang="it-IT"/>
           </a:p>
@@ -1267,7 +1267,7 @@
           <a:p>
             <a:fld id="{FEAFAA5B-A067-44C5-BC05-80171B363320}" type="datetimeFigureOut">
               <a:rPr lang="it-IT" smtClean="0"/>
-              <a:t>14/11/2023</a:t>
+              <a:t>15/11/2023</a:t>
             </a:fld>
             <a:endParaRPr lang="it-IT"/>
           </a:p>
@@ -1634,7 +1634,7 @@
           <a:p>
             <a:fld id="{FEAFAA5B-A067-44C5-BC05-80171B363320}" type="datetimeFigureOut">
               <a:rPr lang="it-IT" smtClean="0"/>
-              <a:t>14/11/2023</a:t>
+              <a:t>15/11/2023</a:t>
             </a:fld>
             <a:endParaRPr lang="it-IT"/>
           </a:p>
@@ -1752,7 +1752,7 @@
           <a:p>
             <a:fld id="{FEAFAA5B-A067-44C5-BC05-80171B363320}" type="datetimeFigureOut">
               <a:rPr lang="it-IT" smtClean="0"/>
-              <a:t>14/11/2023</a:t>
+              <a:t>15/11/2023</a:t>
             </a:fld>
             <a:endParaRPr lang="it-IT"/>
           </a:p>
@@ -1847,7 +1847,7 @@
           <a:p>
             <a:fld id="{FEAFAA5B-A067-44C5-BC05-80171B363320}" type="datetimeFigureOut">
               <a:rPr lang="it-IT" smtClean="0"/>
-              <a:t>14/11/2023</a:t>
+              <a:t>15/11/2023</a:t>
             </a:fld>
             <a:endParaRPr lang="it-IT"/>
           </a:p>
@@ -2124,7 +2124,7 @@
           <a:p>
             <a:fld id="{FEAFAA5B-A067-44C5-BC05-80171B363320}" type="datetimeFigureOut">
               <a:rPr lang="it-IT" smtClean="0"/>
-              <a:t>14/11/2023</a:t>
+              <a:t>15/11/2023</a:t>
             </a:fld>
             <a:endParaRPr lang="it-IT"/>
           </a:p>
@@ -2377,7 +2377,7 @@
           <a:p>
             <a:fld id="{FEAFAA5B-A067-44C5-BC05-80171B363320}" type="datetimeFigureOut">
               <a:rPr lang="it-IT" smtClean="0"/>
-              <a:t>14/11/2023</a:t>
+              <a:t>15/11/2023</a:t>
             </a:fld>
             <a:endParaRPr lang="it-IT"/>
           </a:p>
@@ -2599,7 +2599,7 @@
           <a:p>
             <a:fld id="{FEAFAA5B-A067-44C5-BC05-80171B363320}" type="datetimeFigureOut">
               <a:rPr lang="it-IT" smtClean="0"/>
-              <a:t>14/11/2023</a:t>
+              <a:t>15/11/2023</a:t>
             </a:fld>
             <a:endParaRPr lang="it-IT"/>
           </a:p>
@@ -5252,6 +5252,190 @@
           </a:prstGeom>
         </p:spPr>
       </p:pic>
+      <p:sp>
+        <p:nvSpPr>
+          <p:cNvPr id="3" name="Ovale 2"/>
+          <p:cNvSpPr/>
+          <p:nvPr/>
+        </p:nvSpPr>
+        <p:spPr>
+          <a:xfrm>
+            <a:off x="1933618" y="1960604"/>
+            <a:ext cx="1995831" cy="1993557"/>
+          </a:xfrm>
+          <a:prstGeom prst="ellipse">
+            <a:avLst/>
+          </a:prstGeom>
+          <a:noFill/>
+          <a:ln>
+            <a:solidFill>
+              <a:srgbClr val="FF0000"/>
+            </a:solidFill>
+          </a:ln>
+        </p:spPr>
+        <p:style>
+          <a:lnRef idx="2">
+            <a:schemeClr val="accent1">
+              <a:shade val="50000"/>
+            </a:schemeClr>
+          </a:lnRef>
+          <a:fillRef idx="1">
+            <a:schemeClr val="accent1"/>
+          </a:fillRef>
+          <a:effectRef idx="0">
+            <a:schemeClr val="accent1"/>
+          </a:effectRef>
+          <a:fontRef idx="minor">
+            <a:schemeClr val="lt1"/>
+          </a:fontRef>
+        </p:style>
+        <p:txBody>
+          <a:bodyPr rtlCol="0" anchor="ctr"/>
+          <a:lstStyle/>
+          <a:p>
+            <a:pPr algn="ctr"/>
+            <a:endParaRPr lang="it-IT"/>
+          </a:p>
+        </p:txBody>
+      </p:sp>
+      <p:sp>
+        <p:nvSpPr>
+          <p:cNvPr id="7" name="Ovale 6"/>
+          <p:cNvSpPr/>
+          <p:nvPr/>
+        </p:nvSpPr>
+        <p:spPr>
+          <a:xfrm>
+            <a:off x="1933618" y="4174524"/>
+            <a:ext cx="1995831" cy="1993557"/>
+          </a:xfrm>
+          <a:prstGeom prst="ellipse">
+            <a:avLst/>
+          </a:prstGeom>
+          <a:noFill/>
+          <a:ln>
+            <a:solidFill>
+              <a:srgbClr val="FF0000"/>
+            </a:solidFill>
+          </a:ln>
+        </p:spPr>
+        <p:style>
+          <a:lnRef idx="2">
+            <a:schemeClr val="accent1">
+              <a:shade val="50000"/>
+            </a:schemeClr>
+          </a:lnRef>
+          <a:fillRef idx="1">
+            <a:schemeClr val="accent1"/>
+          </a:fillRef>
+          <a:effectRef idx="0">
+            <a:schemeClr val="accent1"/>
+          </a:effectRef>
+          <a:fontRef idx="minor">
+            <a:schemeClr val="lt1"/>
+          </a:fontRef>
+        </p:style>
+        <p:txBody>
+          <a:bodyPr rtlCol="0" anchor="ctr"/>
+          <a:lstStyle/>
+          <a:p>
+            <a:pPr algn="ctr"/>
+            <a:endParaRPr lang="it-IT"/>
+          </a:p>
+        </p:txBody>
+      </p:sp>
+      <p:sp>
+        <p:nvSpPr>
+          <p:cNvPr id="8" name="Ovale 7"/>
+          <p:cNvSpPr/>
+          <p:nvPr/>
+        </p:nvSpPr>
+        <p:spPr>
+          <a:xfrm>
+            <a:off x="3682598" y="4174524"/>
+            <a:ext cx="1995831" cy="1993557"/>
+          </a:xfrm>
+          <a:prstGeom prst="ellipse">
+            <a:avLst/>
+          </a:prstGeom>
+          <a:noFill/>
+          <a:ln>
+            <a:solidFill>
+              <a:srgbClr val="FF0000"/>
+            </a:solidFill>
+          </a:ln>
+        </p:spPr>
+        <p:style>
+          <a:lnRef idx="2">
+            <a:schemeClr val="accent1">
+              <a:shade val="50000"/>
+            </a:schemeClr>
+          </a:lnRef>
+          <a:fillRef idx="1">
+            <a:schemeClr val="accent1"/>
+          </a:fillRef>
+          <a:effectRef idx="0">
+            <a:schemeClr val="accent1"/>
+          </a:effectRef>
+          <a:fontRef idx="minor">
+            <a:schemeClr val="lt1"/>
+          </a:fontRef>
+        </p:style>
+        <p:txBody>
+          <a:bodyPr rtlCol="0" anchor="ctr"/>
+          <a:lstStyle/>
+          <a:p>
+            <a:pPr algn="ctr"/>
+            <a:endParaRPr lang="it-IT"/>
+          </a:p>
+        </p:txBody>
+      </p:sp>
+      <p:sp>
+        <p:nvSpPr>
+          <p:cNvPr id="9" name="Ovale 8"/>
+          <p:cNvSpPr/>
+          <p:nvPr/>
+        </p:nvSpPr>
+        <p:spPr>
+          <a:xfrm>
+            <a:off x="5611813" y="4096322"/>
+            <a:ext cx="1995831" cy="1993557"/>
+          </a:xfrm>
+          <a:prstGeom prst="ellipse">
+            <a:avLst/>
+          </a:prstGeom>
+          <a:noFill/>
+          <a:ln>
+            <a:solidFill>
+              <a:srgbClr val="FF0000"/>
+            </a:solidFill>
+          </a:ln>
+        </p:spPr>
+        <p:style>
+          <a:lnRef idx="2">
+            <a:schemeClr val="accent1">
+              <a:shade val="50000"/>
+            </a:schemeClr>
+          </a:lnRef>
+          <a:fillRef idx="1">
+            <a:schemeClr val="accent1"/>
+          </a:fillRef>
+          <a:effectRef idx="0">
+            <a:schemeClr val="accent1"/>
+          </a:effectRef>
+          <a:fontRef idx="minor">
+            <a:schemeClr val="lt1"/>
+          </a:fontRef>
+        </p:style>
+        <p:txBody>
+          <a:bodyPr rtlCol="0" anchor="ctr"/>
+          <a:lstStyle/>
+          <a:p>
+            <a:pPr algn="ctr"/>
+            <a:endParaRPr lang="it-IT"/>
+          </a:p>
+        </p:txBody>
+      </p:sp>
     </p:spTree>
     <p:extLst>
       <p:ext uri="{BB962C8B-B14F-4D97-AF65-F5344CB8AC3E}">

</xml_diff>

<commit_message>
Updated presentation and repo
</commit_message>
<xml_diff>
--- a/presentation.pptx
+++ b/presentation.pptx
@@ -269,7 +269,7 @@
           <a:p>
             <a:fld id="{FEAFAA5B-A067-44C5-BC05-80171B363320}" type="datetimeFigureOut">
               <a:rPr lang="it-IT" smtClean="0"/>
-              <a:t>17/11/2023</a:t>
+              <a:t>30/11/2023</a:t>
             </a:fld>
             <a:endParaRPr lang="it-IT"/>
           </a:p>
@@ -439,7 +439,7 @@
           <a:p>
             <a:fld id="{FEAFAA5B-A067-44C5-BC05-80171B363320}" type="datetimeFigureOut">
               <a:rPr lang="it-IT" smtClean="0"/>
-              <a:t>17/11/2023</a:t>
+              <a:t>30/11/2023</a:t>
             </a:fld>
             <a:endParaRPr lang="it-IT"/>
           </a:p>
@@ -619,7 +619,7 @@
           <a:p>
             <a:fld id="{FEAFAA5B-A067-44C5-BC05-80171B363320}" type="datetimeFigureOut">
               <a:rPr lang="it-IT" smtClean="0"/>
-              <a:t>17/11/2023</a:t>
+              <a:t>30/11/2023</a:t>
             </a:fld>
             <a:endParaRPr lang="it-IT"/>
           </a:p>
@@ -789,7 +789,7 @@
           <a:p>
             <a:fld id="{FEAFAA5B-A067-44C5-BC05-80171B363320}" type="datetimeFigureOut">
               <a:rPr lang="it-IT" smtClean="0"/>
-              <a:t>17/11/2023</a:t>
+              <a:t>30/11/2023</a:t>
             </a:fld>
             <a:endParaRPr lang="it-IT"/>
           </a:p>
@@ -1035,7 +1035,7 @@
           <a:p>
             <a:fld id="{FEAFAA5B-A067-44C5-BC05-80171B363320}" type="datetimeFigureOut">
               <a:rPr lang="it-IT" smtClean="0"/>
-              <a:t>17/11/2023</a:t>
+              <a:t>30/11/2023</a:t>
             </a:fld>
             <a:endParaRPr lang="it-IT"/>
           </a:p>
@@ -1267,7 +1267,7 @@
           <a:p>
             <a:fld id="{FEAFAA5B-A067-44C5-BC05-80171B363320}" type="datetimeFigureOut">
               <a:rPr lang="it-IT" smtClean="0"/>
-              <a:t>17/11/2023</a:t>
+              <a:t>30/11/2023</a:t>
             </a:fld>
             <a:endParaRPr lang="it-IT"/>
           </a:p>
@@ -1634,7 +1634,7 @@
           <a:p>
             <a:fld id="{FEAFAA5B-A067-44C5-BC05-80171B363320}" type="datetimeFigureOut">
               <a:rPr lang="it-IT" smtClean="0"/>
-              <a:t>17/11/2023</a:t>
+              <a:t>30/11/2023</a:t>
             </a:fld>
             <a:endParaRPr lang="it-IT"/>
           </a:p>
@@ -1752,7 +1752,7 @@
           <a:p>
             <a:fld id="{FEAFAA5B-A067-44C5-BC05-80171B363320}" type="datetimeFigureOut">
               <a:rPr lang="it-IT" smtClean="0"/>
-              <a:t>17/11/2023</a:t>
+              <a:t>30/11/2023</a:t>
             </a:fld>
             <a:endParaRPr lang="it-IT"/>
           </a:p>
@@ -1847,7 +1847,7 @@
           <a:p>
             <a:fld id="{FEAFAA5B-A067-44C5-BC05-80171B363320}" type="datetimeFigureOut">
               <a:rPr lang="it-IT" smtClean="0"/>
-              <a:t>17/11/2023</a:t>
+              <a:t>30/11/2023</a:t>
             </a:fld>
             <a:endParaRPr lang="it-IT"/>
           </a:p>
@@ -2124,7 +2124,7 @@
           <a:p>
             <a:fld id="{FEAFAA5B-A067-44C5-BC05-80171B363320}" type="datetimeFigureOut">
               <a:rPr lang="it-IT" smtClean="0"/>
-              <a:t>17/11/2023</a:t>
+              <a:t>30/11/2023</a:t>
             </a:fld>
             <a:endParaRPr lang="it-IT"/>
           </a:p>
@@ -2377,7 +2377,7 @@
           <a:p>
             <a:fld id="{FEAFAA5B-A067-44C5-BC05-80171B363320}" type="datetimeFigureOut">
               <a:rPr lang="it-IT" smtClean="0"/>
-              <a:t>17/11/2023</a:t>
+              <a:t>30/11/2023</a:t>
             </a:fld>
             <a:endParaRPr lang="it-IT"/>
           </a:p>
@@ -2599,7 +2599,7 @@
           <a:p>
             <a:fld id="{FEAFAA5B-A067-44C5-BC05-80171B363320}" type="datetimeFigureOut">
               <a:rPr lang="it-IT" smtClean="0"/>
-              <a:t>17/11/2023</a:t>
+              <a:t>30/11/2023</a:t>
             </a:fld>
             <a:endParaRPr lang="it-IT"/>
           </a:p>
@@ -4405,11 +4405,7 @@
             </a:r>
             <a:r>
               <a:rPr lang="it-IT" smtClean="0"/>
-              <a:t>è </a:t>
-            </a:r>
-            <a:r>
-              <a:rPr lang="it-IT" smtClean="0"/>
-              <a:t>difficile (specialmente</a:t>
+              <a:t>è difficile (specialmente</a:t>
             </a:r>
             <a:br>
               <a:rPr lang="it-IT" smtClean="0"/>
@@ -4899,8 +4895,16 @@
               <a:buChar char="•"/>
             </a:pPr>
             <a:r>
-              <a:rPr lang="it-IT" sz="2800" smtClean="0"/>
-              <a:t>Percezione di Dot Patterns e Gestalt</a:t>
+              <a:rPr lang="it-IT" sz="2800" dirty="0" smtClean="0"/>
+              <a:t>Percezione di Dot </a:t>
+            </a:r>
+            <a:r>
+              <a:rPr lang="it-IT" sz="2800" dirty="0" err="1" smtClean="0"/>
+              <a:t>Patterns</a:t>
+            </a:r>
+            <a:r>
+              <a:rPr lang="it-IT" sz="2800" dirty="0" smtClean="0"/>
+              <a:t> e Gestalt</a:t>
             </a:r>
           </a:p>
           <a:p>
@@ -4909,9 +4913,18 @@
               <a:buChar char="•"/>
             </a:pPr>
             <a:r>
-              <a:rPr lang="it-IT" sz="2800" smtClean="0"/>
-              <a:t>Clustering</a:t>
-            </a:r>
+              <a:rPr lang="it-IT" sz="2800" dirty="0" smtClean="0"/>
+              <a:t>Cos’è il </a:t>
+            </a:r>
+            <a:r>
+              <a:rPr lang="it-IT" sz="2800" dirty="0" err="1" smtClean="0"/>
+              <a:t>clustering</a:t>
+            </a:r>
+            <a:r>
+              <a:rPr lang="it-IT" sz="2800" dirty="0" smtClean="0"/>
+              <a:t>?</a:t>
+            </a:r>
+            <a:endParaRPr lang="it-IT" sz="2800" dirty="0" smtClean="0"/>
           </a:p>
           <a:p>
             <a:pPr marL="285750" indent="-285750">
@@ -4919,9 +4932,14 @@
               <a:buChar char="•"/>
             </a:pPr>
             <a:r>
-              <a:rPr lang="it-IT" sz="2800" smtClean="0"/>
-              <a:t>Algoritmo di Clustering K-Means</a:t>
-            </a:r>
+              <a:rPr lang="it-IT" sz="2800" dirty="0" smtClean="0"/>
+              <a:t>Algoritmo di Clustering K-</a:t>
+            </a:r>
+            <a:r>
+              <a:rPr lang="it-IT" sz="2800" dirty="0" err="1" smtClean="0"/>
+              <a:t>Means</a:t>
+            </a:r>
+            <a:endParaRPr lang="it-IT" sz="2800" dirty="0" smtClean="0"/>
           </a:p>
           <a:p>
             <a:pPr marL="285750" indent="-285750">
@@ -4929,9 +4947,30 @@
               <a:buChar char="•"/>
             </a:pPr>
             <a:r>
-              <a:rPr lang="it-IT" sz="2800" smtClean="0"/>
-              <a:t>Algoritmo basato sul Reduced Delaunay Graph</a:t>
-            </a:r>
+              <a:rPr lang="it-IT" sz="2800" dirty="0" smtClean="0"/>
+              <a:t>Algoritmo basato sul </a:t>
+            </a:r>
+            <a:r>
+              <a:rPr lang="it-IT" sz="2800" dirty="0" err="1" smtClean="0"/>
+              <a:t>Reduced</a:t>
+            </a:r>
+            <a:r>
+              <a:rPr lang="it-IT" sz="2800" dirty="0" smtClean="0"/>
+              <a:t> </a:t>
+            </a:r>
+            <a:r>
+              <a:rPr lang="it-IT" sz="2800" dirty="0" err="1" smtClean="0"/>
+              <a:t>Delaunay</a:t>
+            </a:r>
+            <a:r>
+              <a:rPr lang="it-IT" sz="2800" dirty="0" smtClean="0"/>
+              <a:t> </a:t>
+            </a:r>
+            <a:r>
+              <a:rPr lang="it-IT" sz="2800" dirty="0" err="1" smtClean="0"/>
+              <a:t>Graph</a:t>
+            </a:r>
+            <a:endParaRPr lang="it-IT" sz="2800" dirty="0" smtClean="0"/>
           </a:p>
           <a:p>
             <a:pPr marL="285750" indent="-285750">
@@ -4939,10 +4978,10 @@
               <a:buChar char="•"/>
             </a:pPr>
             <a:r>
-              <a:rPr lang="it-IT" sz="2800" smtClean="0"/>
+              <a:rPr lang="it-IT" sz="2800" dirty="0" smtClean="0"/>
               <a:t>Confronto tra i due algoritmi</a:t>
             </a:r>
-            <a:endParaRPr lang="it-IT" sz="2800"/>
+            <a:endParaRPr lang="it-IT" sz="2800" dirty="0"/>
           </a:p>
         </p:txBody>
       </p:sp>

</xml_diff>